<commit_message>
feat: add objective functions
</commit_message>
<xml_diff>
--- a/documents/Graph Partitioning.pptx
+++ b/documents/Graph Partitioning.pptx
@@ -270,7 +270,7 @@
           <a:p>
             <a:fld id="{DDFFF347-1B57-964D-A4C5-4C2A2FDBE88E}" type="datetimeFigureOut">
               <a:rPr lang="en-US" smtClean="0"/>
-              <a:t>10/30/23</a:t>
+              <a:t>11/13/23</a:t>
             </a:fld>
             <a:endParaRPr lang="en-US"/>
           </a:p>
@@ -468,7 +468,7 @@
           <a:p>
             <a:fld id="{DDFFF347-1B57-964D-A4C5-4C2A2FDBE88E}" type="datetimeFigureOut">
               <a:rPr lang="en-US" smtClean="0"/>
-              <a:t>10/30/23</a:t>
+              <a:t>11/13/23</a:t>
             </a:fld>
             <a:endParaRPr lang="en-US"/>
           </a:p>
@@ -676,7 +676,7 @@
           <a:p>
             <a:fld id="{DDFFF347-1B57-964D-A4C5-4C2A2FDBE88E}" type="datetimeFigureOut">
               <a:rPr lang="en-US" smtClean="0"/>
-              <a:t>10/30/23</a:t>
+              <a:t>11/13/23</a:t>
             </a:fld>
             <a:endParaRPr lang="en-US"/>
           </a:p>
@@ -874,7 +874,7 @@
           <a:p>
             <a:fld id="{DDFFF347-1B57-964D-A4C5-4C2A2FDBE88E}" type="datetimeFigureOut">
               <a:rPr lang="en-US" smtClean="0"/>
-              <a:t>10/30/23</a:t>
+              <a:t>11/13/23</a:t>
             </a:fld>
             <a:endParaRPr lang="en-US"/>
           </a:p>
@@ -1149,7 +1149,7 @@
           <a:p>
             <a:fld id="{DDFFF347-1B57-964D-A4C5-4C2A2FDBE88E}" type="datetimeFigureOut">
               <a:rPr lang="en-US" smtClean="0"/>
-              <a:t>10/30/23</a:t>
+              <a:t>11/13/23</a:t>
             </a:fld>
             <a:endParaRPr lang="en-US"/>
           </a:p>
@@ -1414,7 +1414,7 @@
           <a:p>
             <a:fld id="{DDFFF347-1B57-964D-A4C5-4C2A2FDBE88E}" type="datetimeFigureOut">
               <a:rPr lang="en-US" smtClean="0"/>
-              <a:t>10/30/23</a:t>
+              <a:t>11/13/23</a:t>
             </a:fld>
             <a:endParaRPr lang="en-US"/>
           </a:p>
@@ -1826,7 +1826,7 @@
           <a:p>
             <a:fld id="{DDFFF347-1B57-964D-A4C5-4C2A2FDBE88E}" type="datetimeFigureOut">
               <a:rPr lang="en-US" smtClean="0"/>
-              <a:t>10/30/23</a:t>
+              <a:t>11/13/23</a:t>
             </a:fld>
             <a:endParaRPr lang="en-US"/>
           </a:p>
@@ -1967,7 +1967,7 @@
           <a:p>
             <a:fld id="{DDFFF347-1B57-964D-A4C5-4C2A2FDBE88E}" type="datetimeFigureOut">
               <a:rPr lang="en-US" smtClean="0"/>
-              <a:t>10/30/23</a:t>
+              <a:t>11/13/23</a:t>
             </a:fld>
             <a:endParaRPr lang="en-US"/>
           </a:p>
@@ -2080,7 +2080,7 @@
           <a:p>
             <a:fld id="{DDFFF347-1B57-964D-A4C5-4C2A2FDBE88E}" type="datetimeFigureOut">
               <a:rPr lang="en-US" smtClean="0"/>
-              <a:t>10/30/23</a:t>
+              <a:t>11/13/23</a:t>
             </a:fld>
             <a:endParaRPr lang="en-US"/>
           </a:p>
@@ -2391,7 +2391,7 @@
           <a:p>
             <a:fld id="{DDFFF347-1B57-964D-A4C5-4C2A2FDBE88E}" type="datetimeFigureOut">
               <a:rPr lang="en-US" smtClean="0"/>
-              <a:t>10/30/23</a:t>
+              <a:t>11/13/23</a:t>
             </a:fld>
             <a:endParaRPr lang="en-US"/>
           </a:p>
@@ -2679,7 +2679,7 @@
           <a:p>
             <a:fld id="{DDFFF347-1B57-964D-A4C5-4C2A2FDBE88E}" type="datetimeFigureOut">
               <a:rPr lang="en-US" smtClean="0"/>
-              <a:t>10/30/23</a:t>
+              <a:t>11/13/23</a:t>
             </a:fld>
             <a:endParaRPr lang="en-US"/>
           </a:p>
@@ -2920,7 +2920,7 @@
           <a:p>
             <a:fld id="{DDFFF347-1B57-964D-A4C5-4C2A2FDBE88E}" type="datetimeFigureOut">
               <a:rPr lang="en-US" smtClean="0"/>
-              <a:t>10/30/23</a:t>
+              <a:t>11/13/23</a:t>
             </a:fld>
             <a:endParaRPr lang="en-US"/>
           </a:p>
@@ -7715,7 +7715,7 @@
         <p:spPr>
           <a:xfrm>
             <a:off x="838200" y="1691906"/>
-            <a:ext cx="5369996" cy="369332"/>
+            <a:ext cx="5446940" cy="369332"/>
           </a:xfrm>
           <a:prstGeom prst="rect">
             <a:avLst/>
@@ -7765,8 +7765,8 @@
               <a:t> </a:t>
             </a:r>
             <a:r>
-              <a:rPr lang="en-US" dirty="0" err="1"/>
-              <a:t>tiitk</a:t>
+              <a:rPr lang="en-US"/>
+              <a:t>tititk</a:t>
             </a:r>
             <a:r>
               <a:rPr lang="en-US" dirty="0"/>
@@ -11494,8 +11494,8 @@
           </a:prstGeom>
         </p:spPr>
       </p:pic>
-      <mc:AlternateContent xmlns:mc="http://schemas.openxmlformats.org/markup-compatibility/2006">
-        <mc:Choice xmlns:a14="http://schemas.microsoft.com/office/drawing/2010/main" Requires="a14">
+      <mc:AlternateContent xmlns:mc="http://schemas.openxmlformats.org/markup-compatibility/2006" xmlns:a14="http://schemas.microsoft.com/office/drawing/2010/main">
+        <mc:Choice Requires="a14">
           <p:sp>
             <p:nvSpPr>
               <p:cNvPr id="7" name="TextBox 6">
@@ -11524,6 +11524,7 @@
               </a:bodyPr>
               <a:lstStyle/>
               <a:p>
+                <a:pPr/>
                 <a14:m>
                   <m:oMathPara xmlns:m="http://schemas.openxmlformats.org/officeDocument/2006/math">
                     <m:oMathParaPr>
@@ -11786,7 +11787,7 @@
             </p:txBody>
           </p:sp>
         </mc:Choice>
-        <mc:Fallback>
+        <mc:Fallback xmlns="">
           <p:sp>
             <p:nvSpPr>
               <p:cNvPr id="7" name="TextBox 6">
@@ -11831,8 +11832,8 @@
           </p:sp>
         </mc:Fallback>
       </mc:AlternateContent>
-      <mc:AlternateContent xmlns:mc="http://schemas.openxmlformats.org/markup-compatibility/2006">
-        <mc:Choice xmlns:a14="http://schemas.microsoft.com/office/drawing/2010/main" Requires="a14">
+      <mc:AlternateContent xmlns:mc="http://schemas.openxmlformats.org/markup-compatibility/2006" xmlns:a14="http://schemas.microsoft.com/office/drawing/2010/main">
+        <mc:Choice Requires="a14">
           <p:sp>
             <p:nvSpPr>
               <p:cNvPr id="8" name="TextBox 7">
@@ -11861,6 +11862,7 @@
               </a:bodyPr>
               <a:lstStyle/>
               <a:p>
+                <a:pPr/>
                 <a14:m>
                   <m:oMathPara xmlns:m="http://schemas.openxmlformats.org/officeDocument/2006/math">
                     <m:oMathParaPr>
@@ -12061,7 +12063,7 @@
             </p:txBody>
           </p:sp>
         </mc:Choice>
-        <mc:Fallback>
+        <mc:Fallback xmlns="">
           <p:sp>
             <p:nvSpPr>
               <p:cNvPr id="8" name="TextBox 7">
@@ -12106,8 +12108,8 @@
           </p:sp>
         </mc:Fallback>
       </mc:AlternateContent>
-      <mc:AlternateContent xmlns:mc="http://schemas.openxmlformats.org/markup-compatibility/2006">
-        <mc:Choice xmlns:a14="http://schemas.microsoft.com/office/drawing/2010/main" Requires="a14">
+      <mc:AlternateContent xmlns:mc="http://schemas.openxmlformats.org/markup-compatibility/2006" xmlns:a14="http://schemas.microsoft.com/office/drawing/2010/main">
+        <mc:Choice Requires="a14">
           <p:sp>
             <p:nvSpPr>
               <p:cNvPr id="10" name="TextBox 9">
@@ -12136,6 +12138,7 @@
               </a:bodyPr>
               <a:lstStyle/>
               <a:p>
+                <a:pPr/>
                 <a14:m>
                   <m:oMathPara xmlns:m="http://schemas.openxmlformats.org/officeDocument/2006/math">
                     <m:oMathParaPr>
@@ -12274,7 +12277,7 @@
             </p:txBody>
           </p:sp>
         </mc:Choice>
-        <mc:Fallback>
+        <mc:Fallback xmlns="">
           <p:sp>
             <p:nvSpPr>
               <p:cNvPr id="10" name="TextBox 9">
@@ -12319,8 +12322,8 @@
           </p:sp>
         </mc:Fallback>
       </mc:AlternateContent>
-      <mc:AlternateContent xmlns:mc="http://schemas.openxmlformats.org/markup-compatibility/2006">
-        <mc:Choice xmlns:a14="http://schemas.microsoft.com/office/drawing/2010/main" Requires="a14">
+      <mc:AlternateContent xmlns:mc="http://schemas.openxmlformats.org/markup-compatibility/2006" xmlns:a14="http://schemas.microsoft.com/office/drawing/2010/main">
+        <mc:Choice Requires="a14">
           <p:sp>
             <p:nvSpPr>
               <p:cNvPr id="12" name="TextBox 11">
@@ -12349,6 +12352,7 @@
               </a:bodyPr>
               <a:lstStyle/>
               <a:p>
+                <a:pPr/>
                 <a14:m>
                   <m:oMathPara xmlns:m="http://schemas.openxmlformats.org/officeDocument/2006/math">
                     <m:oMathParaPr>
@@ -12549,7 +12553,7 @@
             </p:txBody>
           </p:sp>
         </mc:Choice>
-        <mc:Fallback>
+        <mc:Fallback xmlns="">
           <p:sp>
             <p:nvSpPr>
               <p:cNvPr id="12" name="TextBox 11">

</xml_diff>

<commit_message>
feat: finish presentation slide
</commit_message>
<xml_diff>
--- a/documents/Graph Partitioning.pptx
+++ b/documents/Graph Partitioning.pptx
@@ -5,7 +5,7 @@
     <p:sldMasterId id="2147483648" r:id="rId1"/>
   </p:sldMasterIdLst>
   <p:notesMasterIdLst>
-    <p:notesMasterId r:id="rId43"/>
+    <p:notesMasterId r:id="rId45"/>
   </p:notesMasterIdLst>
   <p:sldIdLst>
     <p:sldId id="256" r:id="rId2"/>
@@ -48,7 +48,9 @@
     <p:sldId id="304" r:id="rId39"/>
     <p:sldId id="306" r:id="rId40"/>
     <p:sldId id="307" r:id="rId41"/>
-    <p:sldId id="266" r:id="rId42"/>
+    <p:sldId id="308" r:id="rId42"/>
+    <p:sldId id="309" r:id="rId43"/>
+    <p:sldId id="266" r:id="rId44"/>
   </p:sldIdLst>
   <p:sldSz cx="12192000" cy="6858000"/>
   <p:notesSz cx="6858000" cy="9144000"/>
@@ -237,7 +239,7 @@
           <a:p>
             <a:fld id="{E8AD3D29-4055-E148-9A90-2643CE96BE82}" type="datetimeFigureOut">
               <a:rPr lang="en-US" smtClean="0"/>
-              <a:t>11/25/23</a:t>
+              <a:t>11/26/23</a:t>
             </a:fld>
             <a:endParaRPr lang="en-US"/>
           </a:p>
@@ -3003,7 +3005,7 @@
           <a:p>
             <a:fld id="{DDFFF347-1B57-964D-A4C5-4C2A2FDBE88E}" type="datetimeFigureOut">
               <a:rPr lang="en-US" smtClean="0"/>
-              <a:t>11/25/23</a:t>
+              <a:t>11/26/23</a:t>
             </a:fld>
             <a:endParaRPr lang="en-US"/>
           </a:p>
@@ -3201,7 +3203,7 @@
           <a:p>
             <a:fld id="{DDFFF347-1B57-964D-A4C5-4C2A2FDBE88E}" type="datetimeFigureOut">
               <a:rPr lang="en-US" smtClean="0"/>
-              <a:t>11/25/23</a:t>
+              <a:t>11/26/23</a:t>
             </a:fld>
             <a:endParaRPr lang="en-US"/>
           </a:p>
@@ -3409,7 +3411,7 @@
           <a:p>
             <a:fld id="{DDFFF347-1B57-964D-A4C5-4C2A2FDBE88E}" type="datetimeFigureOut">
               <a:rPr lang="en-US" smtClean="0"/>
-              <a:t>11/25/23</a:t>
+              <a:t>11/26/23</a:t>
             </a:fld>
             <a:endParaRPr lang="en-US"/>
           </a:p>
@@ -3607,7 +3609,7 @@
           <a:p>
             <a:fld id="{DDFFF347-1B57-964D-A4C5-4C2A2FDBE88E}" type="datetimeFigureOut">
               <a:rPr lang="en-US" smtClean="0"/>
-              <a:t>11/25/23</a:t>
+              <a:t>11/26/23</a:t>
             </a:fld>
             <a:endParaRPr lang="en-US"/>
           </a:p>
@@ -3882,7 +3884,7 @@
           <a:p>
             <a:fld id="{DDFFF347-1B57-964D-A4C5-4C2A2FDBE88E}" type="datetimeFigureOut">
               <a:rPr lang="en-US" smtClean="0"/>
-              <a:t>11/25/23</a:t>
+              <a:t>11/26/23</a:t>
             </a:fld>
             <a:endParaRPr lang="en-US"/>
           </a:p>
@@ -4147,7 +4149,7 @@
           <a:p>
             <a:fld id="{DDFFF347-1B57-964D-A4C5-4C2A2FDBE88E}" type="datetimeFigureOut">
               <a:rPr lang="en-US" smtClean="0"/>
-              <a:t>11/25/23</a:t>
+              <a:t>11/26/23</a:t>
             </a:fld>
             <a:endParaRPr lang="en-US"/>
           </a:p>
@@ -4559,7 +4561,7 @@
           <a:p>
             <a:fld id="{DDFFF347-1B57-964D-A4C5-4C2A2FDBE88E}" type="datetimeFigureOut">
               <a:rPr lang="en-US" smtClean="0"/>
-              <a:t>11/25/23</a:t>
+              <a:t>11/26/23</a:t>
             </a:fld>
             <a:endParaRPr lang="en-US"/>
           </a:p>
@@ -4700,7 +4702,7 @@
           <a:p>
             <a:fld id="{DDFFF347-1B57-964D-A4C5-4C2A2FDBE88E}" type="datetimeFigureOut">
               <a:rPr lang="en-US" smtClean="0"/>
-              <a:t>11/25/23</a:t>
+              <a:t>11/26/23</a:t>
             </a:fld>
             <a:endParaRPr lang="en-US"/>
           </a:p>
@@ -4813,7 +4815,7 @@
           <a:p>
             <a:fld id="{DDFFF347-1B57-964D-A4C5-4C2A2FDBE88E}" type="datetimeFigureOut">
               <a:rPr lang="en-US" smtClean="0"/>
-              <a:t>11/25/23</a:t>
+              <a:t>11/26/23</a:t>
             </a:fld>
             <a:endParaRPr lang="en-US"/>
           </a:p>
@@ -5124,7 +5126,7 @@
           <a:p>
             <a:fld id="{DDFFF347-1B57-964D-A4C5-4C2A2FDBE88E}" type="datetimeFigureOut">
               <a:rPr lang="en-US" smtClean="0"/>
-              <a:t>11/25/23</a:t>
+              <a:t>11/26/23</a:t>
             </a:fld>
             <a:endParaRPr lang="en-US"/>
           </a:p>
@@ -5412,7 +5414,7 @@
           <a:p>
             <a:fld id="{DDFFF347-1B57-964D-A4C5-4C2A2FDBE88E}" type="datetimeFigureOut">
               <a:rPr lang="en-US" smtClean="0"/>
-              <a:t>11/25/23</a:t>
+              <a:t>11/26/23</a:t>
             </a:fld>
             <a:endParaRPr lang="en-US"/>
           </a:p>
@@ -5653,7 +5655,7 @@
           <a:p>
             <a:fld id="{DDFFF347-1B57-964D-A4C5-4C2A2FDBE88E}" type="datetimeFigureOut">
               <a:rPr lang="en-US" smtClean="0"/>
-              <a:t>11/25/23</a:t>
+              <a:t>11/26/23</a:t>
             </a:fld>
             <a:endParaRPr lang="en-US"/>
           </a:p>
@@ -37186,6 +37188,1352 @@
           </a:p>
         </p:txBody>
       </p:sp>
+      <p:sp>
+        <p:nvSpPr>
+          <p:cNvPr id="2" name="TextBox 1">
+            <a:extLst>
+              <a:ext uri="{FF2B5EF4-FFF2-40B4-BE49-F238E27FC236}">
+                <a16:creationId xmlns:a16="http://schemas.microsoft.com/office/drawing/2014/main" id="{248E0E9F-D7A1-3F14-F32B-61CE2E704A6D}"/>
+              </a:ext>
+            </a:extLst>
+          </p:cNvPr>
+          <p:cNvSpPr txBox="1"/>
+          <p:nvPr/>
+        </p:nvSpPr>
+        <p:spPr>
+          <a:xfrm>
+            <a:off x="592183" y="1506022"/>
+            <a:ext cx="2300630" cy="369332"/>
+          </a:xfrm>
+          <a:prstGeom prst="rect">
+            <a:avLst/>
+          </a:prstGeom>
+          <a:noFill/>
+        </p:spPr>
+        <p:txBody>
+          <a:bodyPr wrap="none" rtlCol="0">
+            <a:spAutoFit/>
+          </a:bodyPr>
+          <a:lstStyle/>
+          <a:p>
+            <a:r>
+              <a:rPr lang="en-US" dirty="0"/>
+              <a:t>Proses </a:t>
+            </a:r>
+            <a:r>
+              <a:rPr lang="en-US" dirty="0" err="1"/>
+              <a:t>dengan</a:t>
+            </a:r>
+            <a:r>
+              <a:rPr lang="en-US" dirty="0"/>
+              <a:t> NSGA II</a:t>
+            </a:r>
+          </a:p>
+        </p:txBody>
+      </p:sp>
+      <p:sp>
+        <p:nvSpPr>
+          <p:cNvPr id="3" name="Rectangle 2">
+            <a:extLst>
+              <a:ext uri="{FF2B5EF4-FFF2-40B4-BE49-F238E27FC236}">
+                <a16:creationId xmlns:a16="http://schemas.microsoft.com/office/drawing/2014/main" id="{BC446399-B9E9-41DF-2086-089B5050187F}"/>
+              </a:ext>
+            </a:extLst>
+          </p:cNvPr>
+          <p:cNvSpPr/>
+          <p:nvPr/>
+        </p:nvSpPr>
+        <p:spPr>
+          <a:xfrm>
+            <a:off x="1680755" y="2185334"/>
+            <a:ext cx="1369426" cy="488649"/>
+          </a:xfrm>
+          <a:prstGeom prst="rect">
+            <a:avLst/>
+          </a:prstGeom>
+          <a:solidFill>
+            <a:srgbClr val="92D050"/>
+          </a:solidFill>
+          <a:ln>
+            <a:noFill/>
+          </a:ln>
+        </p:spPr>
+        <p:style>
+          <a:lnRef idx="2">
+            <a:schemeClr val="accent1">
+              <a:shade val="15000"/>
+            </a:schemeClr>
+          </a:lnRef>
+          <a:fillRef idx="1">
+            <a:schemeClr val="accent1"/>
+          </a:fillRef>
+          <a:effectRef idx="0">
+            <a:schemeClr val="accent1"/>
+          </a:effectRef>
+          <a:fontRef idx="minor">
+            <a:schemeClr val="lt1"/>
+          </a:fontRef>
+        </p:style>
+        <p:txBody>
+          <a:bodyPr rtlCol="0" anchor="ctr"/>
+          <a:lstStyle/>
+          <a:p>
+            <a:pPr algn="ctr"/>
+            <a:r>
+              <a:rPr lang="en-US" sz="1400" b="1" dirty="0" err="1"/>
+              <a:t>Inisialisasi</a:t>
+            </a:r>
+            <a:r>
+              <a:rPr lang="en-US" sz="1400" b="1" dirty="0"/>
+              <a:t> N </a:t>
+            </a:r>
+            <a:r>
+              <a:rPr lang="en-US" sz="1400" b="1" dirty="0" err="1"/>
+              <a:t>Populasi</a:t>
+            </a:r>
+            <a:endParaRPr lang="en-US" sz="1400" b="1" dirty="0"/>
+          </a:p>
+        </p:txBody>
+      </p:sp>
+      <p:sp>
+        <p:nvSpPr>
+          <p:cNvPr id="4" name="Rectangle 3">
+            <a:extLst>
+              <a:ext uri="{FF2B5EF4-FFF2-40B4-BE49-F238E27FC236}">
+                <a16:creationId xmlns:a16="http://schemas.microsoft.com/office/drawing/2014/main" id="{F1E1BC7E-ADAE-2020-0043-A7217FE9DF35}"/>
+              </a:ext>
+            </a:extLst>
+          </p:cNvPr>
+          <p:cNvSpPr/>
+          <p:nvPr/>
+        </p:nvSpPr>
+        <p:spPr>
+          <a:xfrm>
+            <a:off x="3473752" y="2185334"/>
+            <a:ext cx="1369426" cy="488649"/>
+          </a:xfrm>
+          <a:prstGeom prst="rect">
+            <a:avLst/>
+          </a:prstGeom>
+          <a:solidFill>
+            <a:srgbClr val="92D050"/>
+          </a:solidFill>
+          <a:ln>
+            <a:noFill/>
+          </a:ln>
+        </p:spPr>
+        <p:style>
+          <a:lnRef idx="2">
+            <a:schemeClr val="accent1">
+              <a:shade val="15000"/>
+            </a:schemeClr>
+          </a:lnRef>
+          <a:fillRef idx="1">
+            <a:schemeClr val="accent1"/>
+          </a:fillRef>
+          <a:effectRef idx="0">
+            <a:schemeClr val="accent1"/>
+          </a:effectRef>
+          <a:fontRef idx="minor">
+            <a:schemeClr val="lt1"/>
+          </a:fontRef>
+        </p:style>
+        <p:txBody>
+          <a:bodyPr rtlCol="0" anchor="ctr"/>
+          <a:lstStyle/>
+          <a:p>
+            <a:pPr algn="ctr"/>
+            <a:r>
+              <a:rPr lang="en-US" sz="1400" b="1" dirty="0" err="1"/>
+              <a:t>Evaluasi</a:t>
+            </a:r>
+            <a:r>
+              <a:rPr lang="en-US" sz="1400" b="1" dirty="0"/>
+              <a:t> Nilai F. </a:t>
+            </a:r>
+            <a:r>
+              <a:rPr lang="en-US" sz="1400" b="1" dirty="0" err="1"/>
+              <a:t>Objektif</a:t>
+            </a:r>
+            <a:endParaRPr lang="en-US" sz="1400" b="1" dirty="0"/>
+          </a:p>
+        </p:txBody>
+      </p:sp>
+      <p:sp>
+        <p:nvSpPr>
+          <p:cNvPr id="5" name="Rectangle 4">
+            <a:extLst>
+              <a:ext uri="{FF2B5EF4-FFF2-40B4-BE49-F238E27FC236}">
+                <a16:creationId xmlns:a16="http://schemas.microsoft.com/office/drawing/2014/main" id="{091E298E-6CC7-E14F-884D-68F917F5B22A}"/>
+              </a:ext>
+            </a:extLst>
+          </p:cNvPr>
+          <p:cNvSpPr/>
+          <p:nvPr/>
+        </p:nvSpPr>
+        <p:spPr>
+          <a:xfrm>
+            <a:off x="5364479" y="2263758"/>
+            <a:ext cx="1221624" cy="331799"/>
+          </a:xfrm>
+          <a:prstGeom prst="rect">
+            <a:avLst/>
+          </a:prstGeom>
+          <a:solidFill>
+            <a:srgbClr val="92D050"/>
+          </a:solidFill>
+          <a:ln>
+            <a:noFill/>
+          </a:ln>
+        </p:spPr>
+        <p:style>
+          <a:lnRef idx="2">
+            <a:schemeClr val="accent1">
+              <a:shade val="15000"/>
+            </a:schemeClr>
+          </a:lnRef>
+          <a:fillRef idx="1">
+            <a:schemeClr val="accent1"/>
+          </a:fillRef>
+          <a:effectRef idx="0">
+            <a:schemeClr val="accent1"/>
+          </a:effectRef>
+          <a:fontRef idx="minor">
+            <a:schemeClr val="lt1"/>
+          </a:fontRef>
+        </p:style>
+        <p:txBody>
+          <a:bodyPr rtlCol="0" anchor="ctr"/>
+          <a:lstStyle/>
+          <a:p>
+            <a:pPr algn="ctr"/>
+            <a:r>
+              <a:rPr lang="en-US" sz="1400" b="1" dirty="0"/>
+              <a:t>Rank </a:t>
+            </a:r>
+            <a:r>
+              <a:rPr lang="en-US" sz="1400" b="1" dirty="0" err="1"/>
+              <a:t>Populasi</a:t>
+            </a:r>
+            <a:endParaRPr lang="en-US" sz="1400" b="1" dirty="0"/>
+          </a:p>
+        </p:txBody>
+      </p:sp>
+      <p:sp>
+        <p:nvSpPr>
+          <p:cNvPr id="6" name="Rectangle 5">
+            <a:extLst>
+              <a:ext uri="{FF2B5EF4-FFF2-40B4-BE49-F238E27FC236}">
+                <a16:creationId xmlns:a16="http://schemas.microsoft.com/office/drawing/2014/main" id="{4A77162B-31F1-5F14-EDF2-774B9C13BBAF}"/>
+              </a:ext>
+            </a:extLst>
+          </p:cNvPr>
+          <p:cNvSpPr/>
+          <p:nvPr/>
+        </p:nvSpPr>
+        <p:spPr>
+          <a:xfrm>
+            <a:off x="8482146" y="2263757"/>
+            <a:ext cx="1221624" cy="331799"/>
+          </a:xfrm>
+          <a:prstGeom prst="rect">
+            <a:avLst/>
+          </a:prstGeom>
+          <a:solidFill>
+            <a:srgbClr val="92D050"/>
+          </a:solidFill>
+          <a:ln>
+            <a:noFill/>
+          </a:ln>
+        </p:spPr>
+        <p:style>
+          <a:lnRef idx="2">
+            <a:schemeClr val="accent1">
+              <a:shade val="15000"/>
+            </a:schemeClr>
+          </a:lnRef>
+          <a:fillRef idx="1">
+            <a:schemeClr val="accent1"/>
+          </a:fillRef>
+          <a:effectRef idx="0">
+            <a:schemeClr val="accent1"/>
+          </a:effectRef>
+          <a:fontRef idx="minor">
+            <a:schemeClr val="lt1"/>
+          </a:fontRef>
+        </p:style>
+        <p:txBody>
+          <a:bodyPr rtlCol="0" anchor="ctr"/>
+          <a:lstStyle/>
+          <a:p>
+            <a:pPr algn="ctr"/>
+            <a:r>
+              <a:rPr lang="en-US" sz="1400" b="1" dirty="0"/>
+              <a:t>Selection</a:t>
+            </a:r>
+          </a:p>
+        </p:txBody>
+      </p:sp>
+      <p:sp>
+        <p:nvSpPr>
+          <p:cNvPr id="7" name="Rectangle 6">
+            <a:extLst>
+              <a:ext uri="{FF2B5EF4-FFF2-40B4-BE49-F238E27FC236}">
+                <a16:creationId xmlns:a16="http://schemas.microsoft.com/office/drawing/2014/main" id="{0CBC451D-544D-1F8D-DFB2-D8E7ECBCBF5F}"/>
+              </a:ext>
+            </a:extLst>
+          </p:cNvPr>
+          <p:cNvSpPr/>
+          <p:nvPr/>
+        </p:nvSpPr>
+        <p:spPr>
+          <a:xfrm>
+            <a:off x="8482146" y="3081224"/>
+            <a:ext cx="1221624" cy="331799"/>
+          </a:xfrm>
+          <a:prstGeom prst="rect">
+            <a:avLst/>
+          </a:prstGeom>
+          <a:solidFill>
+            <a:srgbClr val="92D050"/>
+          </a:solidFill>
+          <a:ln>
+            <a:noFill/>
+          </a:ln>
+        </p:spPr>
+        <p:style>
+          <a:lnRef idx="2">
+            <a:schemeClr val="accent1">
+              <a:shade val="15000"/>
+            </a:schemeClr>
+          </a:lnRef>
+          <a:fillRef idx="1">
+            <a:schemeClr val="accent1"/>
+          </a:fillRef>
+          <a:effectRef idx="0">
+            <a:schemeClr val="accent1"/>
+          </a:effectRef>
+          <a:fontRef idx="minor">
+            <a:schemeClr val="lt1"/>
+          </a:fontRef>
+        </p:style>
+        <p:txBody>
+          <a:bodyPr rtlCol="0" anchor="ctr"/>
+          <a:lstStyle/>
+          <a:p>
+            <a:pPr algn="ctr"/>
+            <a:r>
+              <a:rPr lang="en-US" sz="1400" b="1"/>
+              <a:t>Crossover</a:t>
+            </a:r>
+            <a:endParaRPr lang="en-US" sz="1400" b="1" dirty="0"/>
+          </a:p>
+        </p:txBody>
+      </p:sp>
+      <p:sp>
+        <p:nvSpPr>
+          <p:cNvPr id="8" name="Rectangle 7">
+            <a:extLst>
+              <a:ext uri="{FF2B5EF4-FFF2-40B4-BE49-F238E27FC236}">
+                <a16:creationId xmlns:a16="http://schemas.microsoft.com/office/drawing/2014/main" id="{87E1FFDF-B031-5553-A16E-D9D5B0E6FE16}"/>
+              </a:ext>
+            </a:extLst>
+          </p:cNvPr>
+          <p:cNvSpPr/>
+          <p:nvPr/>
+        </p:nvSpPr>
+        <p:spPr>
+          <a:xfrm>
+            <a:off x="8482146" y="3863904"/>
+            <a:ext cx="1221624" cy="331799"/>
+          </a:xfrm>
+          <a:prstGeom prst="rect">
+            <a:avLst/>
+          </a:prstGeom>
+          <a:solidFill>
+            <a:srgbClr val="92D050"/>
+          </a:solidFill>
+          <a:ln>
+            <a:noFill/>
+          </a:ln>
+        </p:spPr>
+        <p:style>
+          <a:lnRef idx="2">
+            <a:schemeClr val="accent1">
+              <a:shade val="15000"/>
+            </a:schemeClr>
+          </a:lnRef>
+          <a:fillRef idx="1">
+            <a:schemeClr val="accent1"/>
+          </a:fillRef>
+          <a:effectRef idx="0">
+            <a:schemeClr val="accent1"/>
+          </a:effectRef>
+          <a:fontRef idx="minor">
+            <a:schemeClr val="lt1"/>
+          </a:fontRef>
+        </p:style>
+        <p:txBody>
+          <a:bodyPr rtlCol="0" anchor="ctr"/>
+          <a:lstStyle/>
+          <a:p>
+            <a:pPr algn="ctr"/>
+            <a:r>
+              <a:rPr lang="en-US" sz="1400" b="1"/>
+              <a:t>Mutation</a:t>
+            </a:r>
+            <a:endParaRPr lang="en-US" sz="1400" b="1" dirty="0"/>
+          </a:p>
+        </p:txBody>
+      </p:sp>
+      <p:sp>
+        <p:nvSpPr>
+          <p:cNvPr id="10" name="Rectangle 9">
+            <a:extLst>
+              <a:ext uri="{FF2B5EF4-FFF2-40B4-BE49-F238E27FC236}">
+                <a16:creationId xmlns:a16="http://schemas.microsoft.com/office/drawing/2014/main" id="{3D6A10EE-8A43-5103-1391-70CD8BEC5EAD}"/>
+              </a:ext>
+            </a:extLst>
+          </p:cNvPr>
+          <p:cNvSpPr/>
+          <p:nvPr/>
+        </p:nvSpPr>
+        <p:spPr>
+          <a:xfrm>
+            <a:off x="8408245" y="4646584"/>
+            <a:ext cx="1369426" cy="488649"/>
+          </a:xfrm>
+          <a:prstGeom prst="rect">
+            <a:avLst/>
+          </a:prstGeom>
+          <a:solidFill>
+            <a:srgbClr val="92D050"/>
+          </a:solidFill>
+          <a:ln>
+            <a:noFill/>
+          </a:ln>
+        </p:spPr>
+        <p:style>
+          <a:lnRef idx="2">
+            <a:schemeClr val="accent1">
+              <a:shade val="15000"/>
+            </a:schemeClr>
+          </a:lnRef>
+          <a:fillRef idx="1">
+            <a:schemeClr val="accent1"/>
+          </a:fillRef>
+          <a:effectRef idx="0">
+            <a:schemeClr val="accent1"/>
+          </a:effectRef>
+          <a:fontRef idx="minor">
+            <a:schemeClr val="lt1"/>
+          </a:fontRef>
+        </p:style>
+        <p:txBody>
+          <a:bodyPr rtlCol="0" anchor="ctr"/>
+          <a:lstStyle/>
+          <a:p>
+            <a:pPr algn="ctr"/>
+            <a:r>
+              <a:rPr lang="en-US" sz="1400" b="1" dirty="0" err="1"/>
+              <a:t>Evaluasi</a:t>
+            </a:r>
+            <a:r>
+              <a:rPr lang="en-US" sz="1400" b="1" dirty="0"/>
+              <a:t> Nilai F. </a:t>
+            </a:r>
+            <a:r>
+              <a:rPr lang="en-US" sz="1400" b="1" dirty="0" err="1"/>
+              <a:t>Objektif</a:t>
+            </a:r>
+            <a:endParaRPr lang="en-US" sz="1400" b="1" dirty="0"/>
+          </a:p>
+        </p:txBody>
+      </p:sp>
+      <p:sp>
+        <p:nvSpPr>
+          <p:cNvPr id="11" name="Rectangle 10">
+            <a:extLst>
+              <a:ext uri="{FF2B5EF4-FFF2-40B4-BE49-F238E27FC236}">
+                <a16:creationId xmlns:a16="http://schemas.microsoft.com/office/drawing/2014/main" id="{FC3AAF10-0BC2-1052-E7FB-E87246E00D8B}"/>
+              </a:ext>
+            </a:extLst>
+          </p:cNvPr>
+          <p:cNvSpPr/>
+          <p:nvPr/>
+        </p:nvSpPr>
+        <p:spPr>
+          <a:xfrm>
+            <a:off x="6643370" y="4646584"/>
+            <a:ext cx="1369426" cy="488649"/>
+          </a:xfrm>
+          <a:prstGeom prst="rect">
+            <a:avLst/>
+          </a:prstGeom>
+          <a:solidFill>
+            <a:srgbClr val="92D050"/>
+          </a:solidFill>
+          <a:ln>
+            <a:noFill/>
+          </a:ln>
+        </p:spPr>
+        <p:style>
+          <a:lnRef idx="2">
+            <a:schemeClr val="accent1">
+              <a:shade val="15000"/>
+            </a:schemeClr>
+          </a:lnRef>
+          <a:fillRef idx="1">
+            <a:schemeClr val="accent1"/>
+          </a:fillRef>
+          <a:effectRef idx="0">
+            <a:schemeClr val="accent1"/>
+          </a:effectRef>
+          <a:fontRef idx="minor">
+            <a:schemeClr val="lt1"/>
+          </a:fontRef>
+        </p:style>
+        <p:txBody>
+          <a:bodyPr rtlCol="0" anchor="ctr"/>
+          <a:lstStyle/>
+          <a:p>
+            <a:pPr algn="ctr"/>
+            <a:r>
+              <a:rPr lang="en-US" sz="1400" b="1" dirty="0"/>
+              <a:t>Non-dominated Sorting</a:t>
+            </a:r>
+          </a:p>
+        </p:txBody>
+      </p:sp>
+      <p:sp>
+        <p:nvSpPr>
+          <p:cNvPr id="12" name="Rectangle 11">
+            <a:extLst>
+              <a:ext uri="{FF2B5EF4-FFF2-40B4-BE49-F238E27FC236}">
+                <a16:creationId xmlns:a16="http://schemas.microsoft.com/office/drawing/2014/main" id="{AAE380A5-CD28-900D-F8FA-2F894FB84BBD}"/>
+              </a:ext>
+            </a:extLst>
+          </p:cNvPr>
+          <p:cNvSpPr/>
+          <p:nvPr/>
+        </p:nvSpPr>
+        <p:spPr>
+          <a:xfrm>
+            <a:off x="4931588" y="4646584"/>
+            <a:ext cx="1369426" cy="488649"/>
+          </a:xfrm>
+          <a:prstGeom prst="rect">
+            <a:avLst/>
+          </a:prstGeom>
+          <a:solidFill>
+            <a:srgbClr val="92D050"/>
+          </a:solidFill>
+          <a:ln>
+            <a:noFill/>
+          </a:ln>
+        </p:spPr>
+        <p:style>
+          <a:lnRef idx="2">
+            <a:schemeClr val="accent1">
+              <a:shade val="15000"/>
+            </a:schemeClr>
+          </a:lnRef>
+          <a:fillRef idx="1">
+            <a:schemeClr val="accent1"/>
+          </a:fillRef>
+          <a:effectRef idx="0">
+            <a:schemeClr val="accent1"/>
+          </a:effectRef>
+          <a:fontRef idx="minor">
+            <a:schemeClr val="lt1"/>
+          </a:fontRef>
+        </p:style>
+        <p:txBody>
+          <a:bodyPr rtlCol="0" anchor="ctr"/>
+          <a:lstStyle/>
+          <a:p>
+            <a:pPr algn="ctr"/>
+            <a:r>
+              <a:rPr lang="en-US" sz="1400" b="1" dirty="0"/>
+              <a:t>Crowding distance sorting</a:t>
+            </a:r>
+          </a:p>
+        </p:txBody>
+      </p:sp>
+      <p:cxnSp>
+        <p:nvCxnSpPr>
+          <p:cNvPr id="14" name="Straight Arrow Connector 13">
+            <a:extLst>
+              <a:ext uri="{FF2B5EF4-FFF2-40B4-BE49-F238E27FC236}">
+                <a16:creationId xmlns:a16="http://schemas.microsoft.com/office/drawing/2014/main" id="{D05F08CC-516C-A938-442F-F737287BBAFF}"/>
+              </a:ext>
+            </a:extLst>
+          </p:cNvPr>
+          <p:cNvCxnSpPr>
+            <a:cxnSpLocks/>
+            <a:stCxn id="3" idx="3"/>
+            <a:endCxn id="4" idx="1"/>
+          </p:cNvCxnSpPr>
+          <p:nvPr/>
+        </p:nvCxnSpPr>
+        <p:spPr>
+          <a:xfrm>
+            <a:off x="3050181" y="2429659"/>
+            <a:ext cx="423571" cy="0"/>
+          </a:xfrm>
+          <a:prstGeom prst="straightConnector1">
+            <a:avLst/>
+          </a:prstGeom>
+          <a:ln w="28575">
+            <a:tailEnd type="triangle"/>
+          </a:ln>
+        </p:spPr>
+        <p:style>
+          <a:lnRef idx="1">
+            <a:schemeClr val="dk1"/>
+          </a:lnRef>
+          <a:fillRef idx="0">
+            <a:schemeClr val="dk1"/>
+          </a:fillRef>
+          <a:effectRef idx="0">
+            <a:schemeClr val="dk1"/>
+          </a:effectRef>
+          <a:fontRef idx="minor">
+            <a:schemeClr val="tx1"/>
+          </a:fontRef>
+        </p:style>
+      </p:cxnSp>
+      <p:cxnSp>
+        <p:nvCxnSpPr>
+          <p:cNvPr id="15" name="Straight Arrow Connector 14">
+            <a:extLst>
+              <a:ext uri="{FF2B5EF4-FFF2-40B4-BE49-F238E27FC236}">
+                <a16:creationId xmlns:a16="http://schemas.microsoft.com/office/drawing/2014/main" id="{F6D2AF02-9ED7-A190-17F8-D84AA4441278}"/>
+              </a:ext>
+            </a:extLst>
+          </p:cNvPr>
+          <p:cNvCxnSpPr>
+            <a:cxnSpLocks/>
+            <a:stCxn id="4" idx="3"/>
+            <a:endCxn id="5" idx="1"/>
+          </p:cNvCxnSpPr>
+          <p:nvPr/>
+        </p:nvCxnSpPr>
+        <p:spPr>
+          <a:xfrm flipV="1">
+            <a:off x="4843178" y="2429658"/>
+            <a:ext cx="521301" cy="1"/>
+          </a:xfrm>
+          <a:prstGeom prst="straightConnector1">
+            <a:avLst/>
+          </a:prstGeom>
+          <a:ln w="28575">
+            <a:tailEnd type="triangle"/>
+          </a:ln>
+        </p:spPr>
+        <p:style>
+          <a:lnRef idx="1">
+            <a:schemeClr val="dk1"/>
+          </a:lnRef>
+          <a:fillRef idx="0">
+            <a:schemeClr val="dk1"/>
+          </a:fillRef>
+          <a:effectRef idx="0">
+            <a:schemeClr val="dk1"/>
+          </a:effectRef>
+          <a:fontRef idx="minor">
+            <a:schemeClr val="tx1"/>
+          </a:fontRef>
+        </p:style>
+      </p:cxnSp>
+      <p:cxnSp>
+        <p:nvCxnSpPr>
+          <p:cNvPr id="18" name="Straight Arrow Connector 17">
+            <a:extLst>
+              <a:ext uri="{FF2B5EF4-FFF2-40B4-BE49-F238E27FC236}">
+                <a16:creationId xmlns:a16="http://schemas.microsoft.com/office/drawing/2014/main" id="{563E7006-D0F2-45D6-3315-45E46CC2F837}"/>
+              </a:ext>
+            </a:extLst>
+          </p:cNvPr>
+          <p:cNvCxnSpPr>
+            <a:cxnSpLocks/>
+            <a:stCxn id="5" idx="3"/>
+            <a:endCxn id="6" idx="1"/>
+          </p:cNvCxnSpPr>
+          <p:nvPr/>
+        </p:nvCxnSpPr>
+        <p:spPr>
+          <a:xfrm flipV="1">
+            <a:off x="6586103" y="2429657"/>
+            <a:ext cx="1896043" cy="1"/>
+          </a:xfrm>
+          <a:prstGeom prst="straightConnector1">
+            <a:avLst/>
+          </a:prstGeom>
+          <a:ln w="28575">
+            <a:tailEnd type="triangle"/>
+          </a:ln>
+        </p:spPr>
+        <p:style>
+          <a:lnRef idx="1">
+            <a:schemeClr val="dk1"/>
+          </a:lnRef>
+          <a:fillRef idx="0">
+            <a:schemeClr val="dk1"/>
+          </a:fillRef>
+          <a:effectRef idx="0">
+            <a:schemeClr val="dk1"/>
+          </a:effectRef>
+          <a:fontRef idx="minor">
+            <a:schemeClr val="tx1"/>
+          </a:fontRef>
+        </p:style>
+      </p:cxnSp>
+      <p:cxnSp>
+        <p:nvCxnSpPr>
+          <p:cNvPr id="22" name="Straight Arrow Connector 21">
+            <a:extLst>
+              <a:ext uri="{FF2B5EF4-FFF2-40B4-BE49-F238E27FC236}">
+                <a16:creationId xmlns:a16="http://schemas.microsoft.com/office/drawing/2014/main" id="{BDDB4CDD-A285-7026-CB13-77F45370CE76}"/>
+              </a:ext>
+            </a:extLst>
+          </p:cNvPr>
+          <p:cNvCxnSpPr>
+            <a:cxnSpLocks/>
+            <a:stCxn id="6" idx="2"/>
+            <a:endCxn id="7" idx="0"/>
+          </p:cNvCxnSpPr>
+          <p:nvPr/>
+        </p:nvCxnSpPr>
+        <p:spPr>
+          <a:xfrm>
+            <a:off x="9092958" y="2595556"/>
+            <a:ext cx="0" cy="485668"/>
+          </a:xfrm>
+          <a:prstGeom prst="straightConnector1">
+            <a:avLst/>
+          </a:prstGeom>
+          <a:ln w="28575">
+            <a:tailEnd type="triangle"/>
+          </a:ln>
+        </p:spPr>
+        <p:style>
+          <a:lnRef idx="1">
+            <a:schemeClr val="dk1"/>
+          </a:lnRef>
+          <a:fillRef idx="0">
+            <a:schemeClr val="dk1"/>
+          </a:fillRef>
+          <a:effectRef idx="0">
+            <a:schemeClr val="dk1"/>
+          </a:effectRef>
+          <a:fontRef idx="minor">
+            <a:schemeClr val="tx1"/>
+          </a:fontRef>
+        </p:style>
+      </p:cxnSp>
+      <p:cxnSp>
+        <p:nvCxnSpPr>
+          <p:cNvPr id="28" name="Straight Arrow Connector 27">
+            <a:extLst>
+              <a:ext uri="{FF2B5EF4-FFF2-40B4-BE49-F238E27FC236}">
+                <a16:creationId xmlns:a16="http://schemas.microsoft.com/office/drawing/2014/main" id="{16E258AB-3A7E-5B00-5F63-C099BD5BAB17}"/>
+              </a:ext>
+            </a:extLst>
+          </p:cNvPr>
+          <p:cNvCxnSpPr>
+            <a:cxnSpLocks/>
+            <a:stCxn id="7" idx="2"/>
+            <a:endCxn id="8" idx="0"/>
+          </p:cNvCxnSpPr>
+          <p:nvPr/>
+        </p:nvCxnSpPr>
+        <p:spPr>
+          <a:xfrm>
+            <a:off x="9092958" y="3413023"/>
+            <a:ext cx="0" cy="450881"/>
+          </a:xfrm>
+          <a:prstGeom prst="straightConnector1">
+            <a:avLst/>
+          </a:prstGeom>
+          <a:ln w="28575">
+            <a:tailEnd type="triangle"/>
+          </a:ln>
+        </p:spPr>
+        <p:style>
+          <a:lnRef idx="1">
+            <a:schemeClr val="dk1"/>
+          </a:lnRef>
+          <a:fillRef idx="0">
+            <a:schemeClr val="dk1"/>
+          </a:fillRef>
+          <a:effectRef idx="0">
+            <a:schemeClr val="dk1"/>
+          </a:effectRef>
+          <a:fontRef idx="minor">
+            <a:schemeClr val="tx1"/>
+          </a:fontRef>
+        </p:style>
+      </p:cxnSp>
+      <p:cxnSp>
+        <p:nvCxnSpPr>
+          <p:cNvPr id="31" name="Straight Arrow Connector 30">
+            <a:extLst>
+              <a:ext uri="{FF2B5EF4-FFF2-40B4-BE49-F238E27FC236}">
+                <a16:creationId xmlns:a16="http://schemas.microsoft.com/office/drawing/2014/main" id="{398A49FC-71DD-30FD-2AEB-F44F435F6080}"/>
+              </a:ext>
+            </a:extLst>
+          </p:cNvPr>
+          <p:cNvCxnSpPr>
+            <a:cxnSpLocks/>
+            <a:stCxn id="8" idx="2"/>
+            <a:endCxn id="10" idx="0"/>
+          </p:cNvCxnSpPr>
+          <p:nvPr/>
+        </p:nvCxnSpPr>
+        <p:spPr>
+          <a:xfrm>
+            <a:off x="9092958" y="4195703"/>
+            <a:ext cx="0" cy="450881"/>
+          </a:xfrm>
+          <a:prstGeom prst="straightConnector1">
+            <a:avLst/>
+          </a:prstGeom>
+          <a:ln w="28575">
+            <a:tailEnd type="triangle"/>
+          </a:ln>
+        </p:spPr>
+        <p:style>
+          <a:lnRef idx="1">
+            <a:schemeClr val="dk1"/>
+          </a:lnRef>
+          <a:fillRef idx="0">
+            <a:schemeClr val="dk1"/>
+          </a:fillRef>
+          <a:effectRef idx="0">
+            <a:schemeClr val="dk1"/>
+          </a:effectRef>
+          <a:fontRef idx="minor">
+            <a:schemeClr val="tx1"/>
+          </a:fontRef>
+        </p:style>
+      </p:cxnSp>
+      <p:cxnSp>
+        <p:nvCxnSpPr>
+          <p:cNvPr id="34" name="Straight Arrow Connector 33">
+            <a:extLst>
+              <a:ext uri="{FF2B5EF4-FFF2-40B4-BE49-F238E27FC236}">
+                <a16:creationId xmlns:a16="http://schemas.microsoft.com/office/drawing/2014/main" id="{2230035A-26FB-A0BE-97C3-F8961A9E4DE0}"/>
+              </a:ext>
+            </a:extLst>
+          </p:cNvPr>
+          <p:cNvCxnSpPr>
+            <a:cxnSpLocks/>
+            <a:stCxn id="10" idx="1"/>
+            <a:endCxn id="11" idx="3"/>
+          </p:cNvCxnSpPr>
+          <p:nvPr/>
+        </p:nvCxnSpPr>
+        <p:spPr>
+          <a:xfrm flipH="1">
+            <a:off x="8012796" y="4890909"/>
+            <a:ext cx="395449" cy="0"/>
+          </a:xfrm>
+          <a:prstGeom prst="straightConnector1">
+            <a:avLst/>
+          </a:prstGeom>
+          <a:ln w="28575">
+            <a:tailEnd type="triangle"/>
+          </a:ln>
+        </p:spPr>
+        <p:style>
+          <a:lnRef idx="1">
+            <a:schemeClr val="dk1"/>
+          </a:lnRef>
+          <a:fillRef idx="0">
+            <a:schemeClr val="dk1"/>
+          </a:fillRef>
+          <a:effectRef idx="0">
+            <a:schemeClr val="dk1"/>
+          </a:effectRef>
+          <a:fontRef idx="minor">
+            <a:schemeClr val="tx1"/>
+          </a:fontRef>
+        </p:style>
+      </p:cxnSp>
+      <p:cxnSp>
+        <p:nvCxnSpPr>
+          <p:cNvPr id="37" name="Straight Arrow Connector 36">
+            <a:extLst>
+              <a:ext uri="{FF2B5EF4-FFF2-40B4-BE49-F238E27FC236}">
+                <a16:creationId xmlns:a16="http://schemas.microsoft.com/office/drawing/2014/main" id="{5F4ACCD1-E03C-F367-8175-C4EEF9E42D52}"/>
+              </a:ext>
+            </a:extLst>
+          </p:cNvPr>
+          <p:cNvCxnSpPr>
+            <a:cxnSpLocks/>
+            <a:stCxn id="11" idx="1"/>
+            <a:endCxn id="12" idx="3"/>
+          </p:cNvCxnSpPr>
+          <p:nvPr/>
+        </p:nvCxnSpPr>
+        <p:spPr>
+          <a:xfrm flipH="1">
+            <a:off x="6301014" y="4890909"/>
+            <a:ext cx="342356" cy="0"/>
+          </a:xfrm>
+          <a:prstGeom prst="straightConnector1">
+            <a:avLst/>
+          </a:prstGeom>
+          <a:ln w="28575">
+            <a:tailEnd type="triangle"/>
+          </a:ln>
+        </p:spPr>
+        <p:style>
+          <a:lnRef idx="1">
+            <a:schemeClr val="dk1"/>
+          </a:lnRef>
+          <a:fillRef idx="0">
+            <a:schemeClr val="dk1"/>
+          </a:fillRef>
+          <a:effectRef idx="0">
+            <a:schemeClr val="dk1"/>
+          </a:effectRef>
+          <a:fontRef idx="minor">
+            <a:schemeClr val="tx1"/>
+          </a:fontRef>
+        </p:style>
+      </p:cxnSp>
+      <p:sp>
+        <p:nvSpPr>
+          <p:cNvPr id="40" name="Rectangle 39">
+            <a:extLst>
+              <a:ext uri="{FF2B5EF4-FFF2-40B4-BE49-F238E27FC236}">
+                <a16:creationId xmlns:a16="http://schemas.microsoft.com/office/drawing/2014/main" id="{EA238689-C2AC-F7DB-000B-3B4CB508327F}"/>
+              </a:ext>
+            </a:extLst>
+          </p:cNvPr>
+          <p:cNvSpPr/>
+          <p:nvPr/>
+        </p:nvSpPr>
+        <p:spPr>
+          <a:xfrm>
+            <a:off x="2638697" y="4646584"/>
+            <a:ext cx="1609325" cy="488649"/>
+          </a:xfrm>
+          <a:prstGeom prst="rect">
+            <a:avLst/>
+          </a:prstGeom>
+          <a:solidFill>
+            <a:srgbClr val="92D050"/>
+          </a:solidFill>
+          <a:ln>
+            <a:noFill/>
+          </a:ln>
+        </p:spPr>
+        <p:style>
+          <a:lnRef idx="2">
+            <a:schemeClr val="accent1">
+              <a:shade val="15000"/>
+            </a:schemeClr>
+          </a:lnRef>
+          <a:fillRef idx="1">
+            <a:schemeClr val="accent1"/>
+          </a:fillRef>
+          <a:effectRef idx="0">
+            <a:schemeClr val="accent1"/>
+          </a:effectRef>
+          <a:fontRef idx="minor">
+            <a:schemeClr val="lt1"/>
+          </a:fontRef>
+        </p:style>
+        <p:txBody>
+          <a:bodyPr rtlCol="0" anchor="ctr"/>
+          <a:lstStyle/>
+          <a:p>
+            <a:pPr algn="ctr"/>
+            <a:r>
+              <a:rPr lang="en-US" sz="1400" b="1" dirty="0" err="1"/>
+              <a:t>Memilih</a:t>
+            </a:r>
+            <a:r>
+              <a:rPr lang="en-US" sz="1400" b="1" dirty="0"/>
+              <a:t> N </a:t>
+            </a:r>
+            <a:r>
+              <a:rPr lang="en-US" sz="1400" b="1" dirty="0" err="1"/>
+              <a:t>Populasi</a:t>
+            </a:r>
+            <a:r>
+              <a:rPr lang="en-US" sz="1400" b="1" dirty="0"/>
+              <a:t> </a:t>
+            </a:r>
+            <a:r>
+              <a:rPr lang="en-US" sz="1400" b="1" dirty="0" err="1"/>
+              <a:t>Terbaik</a:t>
+            </a:r>
+            <a:endParaRPr lang="en-US" sz="1400" b="1" dirty="0"/>
+          </a:p>
+        </p:txBody>
+      </p:sp>
+      <p:cxnSp>
+        <p:nvCxnSpPr>
+          <p:cNvPr id="41" name="Straight Arrow Connector 40">
+            <a:extLst>
+              <a:ext uri="{FF2B5EF4-FFF2-40B4-BE49-F238E27FC236}">
+                <a16:creationId xmlns:a16="http://schemas.microsoft.com/office/drawing/2014/main" id="{79CB2F12-9385-A0F3-4706-2AD3ABE8BB3A}"/>
+              </a:ext>
+            </a:extLst>
+          </p:cNvPr>
+          <p:cNvCxnSpPr>
+            <a:cxnSpLocks/>
+            <a:stCxn id="12" idx="1"/>
+            <a:endCxn id="40" idx="3"/>
+          </p:cNvCxnSpPr>
+          <p:nvPr/>
+        </p:nvCxnSpPr>
+        <p:spPr>
+          <a:xfrm flipH="1">
+            <a:off x="4248022" y="4890909"/>
+            <a:ext cx="683566" cy="0"/>
+          </a:xfrm>
+          <a:prstGeom prst="straightConnector1">
+            <a:avLst/>
+          </a:prstGeom>
+          <a:ln w="28575">
+            <a:tailEnd type="triangle"/>
+          </a:ln>
+        </p:spPr>
+        <p:style>
+          <a:lnRef idx="1">
+            <a:schemeClr val="dk1"/>
+          </a:lnRef>
+          <a:fillRef idx="0">
+            <a:schemeClr val="dk1"/>
+          </a:fillRef>
+          <a:effectRef idx="0">
+            <a:schemeClr val="dk1"/>
+          </a:effectRef>
+          <a:fontRef idx="minor">
+            <a:schemeClr val="tx1"/>
+          </a:fontRef>
+        </p:style>
+      </p:cxnSp>
+      <p:cxnSp>
+        <p:nvCxnSpPr>
+          <p:cNvPr id="67" name="Straight Arrow Connector 66">
+            <a:extLst>
+              <a:ext uri="{FF2B5EF4-FFF2-40B4-BE49-F238E27FC236}">
+                <a16:creationId xmlns:a16="http://schemas.microsoft.com/office/drawing/2014/main" id="{16F11BBC-737B-BDAF-2C9F-A31A48616319}"/>
+              </a:ext>
+            </a:extLst>
+          </p:cNvPr>
+          <p:cNvCxnSpPr>
+            <a:cxnSpLocks/>
+            <a:stCxn id="40" idx="0"/>
+            <a:endCxn id="71" idx="2"/>
+          </p:cNvCxnSpPr>
+          <p:nvPr/>
+        </p:nvCxnSpPr>
+        <p:spPr>
+          <a:xfrm flipH="1" flipV="1">
+            <a:off x="3443359" y="3555254"/>
+            <a:ext cx="1" cy="1091330"/>
+          </a:xfrm>
+          <a:prstGeom prst="straightConnector1">
+            <a:avLst/>
+          </a:prstGeom>
+          <a:ln w="28575">
+            <a:tailEnd type="triangle"/>
+          </a:ln>
+        </p:spPr>
+        <p:style>
+          <a:lnRef idx="1">
+            <a:schemeClr val="dk1"/>
+          </a:lnRef>
+          <a:fillRef idx="0">
+            <a:schemeClr val="dk1"/>
+          </a:fillRef>
+          <a:effectRef idx="0">
+            <a:schemeClr val="dk1"/>
+          </a:effectRef>
+          <a:fontRef idx="minor">
+            <a:schemeClr val="tx1"/>
+          </a:fontRef>
+        </p:style>
+      </p:cxnSp>
+      <p:sp>
+        <p:nvSpPr>
+          <p:cNvPr id="71" name="Diamond 70">
+            <a:extLst>
+              <a:ext uri="{FF2B5EF4-FFF2-40B4-BE49-F238E27FC236}">
+                <a16:creationId xmlns:a16="http://schemas.microsoft.com/office/drawing/2014/main" id="{8B1C315C-2D91-AD16-44CA-B093F8671917}"/>
+              </a:ext>
+            </a:extLst>
+          </p:cNvPr>
+          <p:cNvSpPr/>
+          <p:nvPr/>
+        </p:nvSpPr>
+        <p:spPr>
+          <a:xfrm>
+            <a:off x="2690261" y="2938991"/>
+            <a:ext cx="1506196" cy="616263"/>
+          </a:xfrm>
+          <a:prstGeom prst="diamond">
+            <a:avLst/>
+          </a:prstGeom>
+          <a:solidFill>
+            <a:srgbClr val="92D050"/>
+          </a:solidFill>
+          <a:ln>
+            <a:noFill/>
+          </a:ln>
+        </p:spPr>
+        <p:style>
+          <a:lnRef idx="2">
+            <a:schemeClr val="accent1">
+              <a:shade val="15000"/>
+            </a:schemeClr>
+          </a:lnRef>
+          <a:fillRef idx="1">
+            <a:schemeClr val="accent1"/>
+          </a:fillRef>
+          <a:effectRef idx="0">
+            <a:schemeClr val="accent1"/>
+          </a:effectRef>
+          <a:fontRef idx="minor">
+            <a:schemeClr val="lt1"/>
+          </a:fontRef>
+        </p:style>
+        <p:txBody>
+          <a:bodyPr rtlCol="0" anchor="ctr"/>
+          <a:lstStyle/>
+          <a:p>
+            <a:pPr algn="ctr"/>
+            <a:r>
+              <a:rPr lang="en-US" sz="1200" b="1" dirty="0"/>
+              <a:t>Stop </a:t>
+            </a:r>
+            <a:r>
+              <a:rPr lang="en-US" sz="1200" b="1" dirty="0" err="1"/>
+              <a:t>Crieteria</a:t>
+            </a:r>
+            <a:endParaRPr lang="en-US" sz="1200" b="1" dirty="0"/>
+          </a:p>
+        </p:txBody>
+      </p:sp>
+      <p:cxnSp>
+        <p:nvCxnSpPr>
+          <p:cNvPr id="73" name="Straight Arrow Connector 72">
+            <a:extLst>
+              <a:ext uri="{FF2B5EF4-FFF2-40B4-BE49-F238E27FC236}">
+                <a16:creationId xmlns:a16="http://schemas.microsoft.com/office/drawing/2014/main" id="{A296B9A6-054E-AE40-BD04-7412445214CA}"/>
+              </a:ext>
+            </a:extLst>
+          </p:cNvPr>
+          <p:cNvCxnSpPr>
+            <a:cxnSpLocks/>
+            <a:stCxn id="71" idx="3"/>
+            <a:endCxn id="7" idx="1"/>
+          </p:cNvCxnSpPr>
+          <p:nvPr/>
+        </p:nvCxnSpPr>
+        <p:spPr>
+          <a:xfrm>
+            <a:off x="4196457" y="3247123"/>
+            <a:ext cx="4285689" cy="1"/>
+          </a:xfrm>
+          <a:prstGeom prst="straightConnector1">
+            <a:avLst/>
+          </a:prstGeom>
+          <a:ln w="28575">
+            <a:tailEnd type="triangle"/>
+          </a:ln>
+        </p:spPr>
+        <p:style>
+          <a:lnRef idx="1">
+            <a:schemeClr val="dk1"/>
+          </a:lnRef>
+          <a:fillRef idx="0">
+            <a:schemeClr val="dk1"/>
+          </a:fillRef>
+          <a:effectRef idx="0">
+            <a:schemeClr val="dk1"/>
+          </a:effectRef>
+          <a:fontRef idx="minor">
+            <a:schemeClr val="tx1"/>
+          </a:fontRef>
+        </p:style>
+      </p:cxnSp>
+      <p:cxnSp>
+        <p:nvCxnSpPr>
+          <p:cNvPr id="79" name="Straight Arrow Connector 78">
+            <a:extLst>
+              <a:ext uri="{FF2B5EF4-FFF2-40B4-BE49-F238E27FC236}">
+                <a16:creationId xmlns:a16="http://schemas.microsoft.com/office/drawing/2014/main" id="{4C6B600B-3059-AA91-52DB-CD4C6461B953}"/>
+              </a:ext>
+            </a:extLst>
+          </p:cNvPr>
+          <p:cNvCxnSpPr>
+            <a:cxnSpLocks/>
+            <a:stCxn id="71" idx="1"/>
+            <a:endCxn id="83" idx="3"/>
+          </p:cNvCxnSpPr>
+          <p:nvPr/>
+        </p:nvCxnSpPr>
+        <p:spPr>
+          <a:xfrm flipH="1" flipV="1">
+            <a:off x="2174926" y="3243553"/>
+            <a:ext cx="515335" cy="3570"/>
+          </a:xfrm>
+          <a:prstGeom prst="straightConnector1">
+            <a:avLst/>
+          </a:prstGeom>
+          <a:ln w="28575">
+            <a:tailEnd type="triangle"/>
+          </a:ln>
+        </p:spPr>
+        <p:style>
+          <a:lnRef idx="1">
+            <a:schemeClr val="dk1"/>
+          </a:lnRef>
+          <a:fillRef idx="0">
+            <a:schemeClr val="dk1"/>
+          </a:fillRef>
+          <a:effectRef idx="0">
+            <a:schemeClr val="dk1"/>
+          </a:effectRef>
+          <a:fontRef idx="minor">
+            <a:schemeClr val="tx1"/>
+          </a:fontRef>
+        </p:style>
+      </p:cxnSp>
+      <p:sp>
+        <p:nvSpPr>
+          <p:cNvPr id="83" name="Rectangle 82">
+            <a:extLst>
+              <a:ext uri="{FF2B5EF4-FFF2-40B4-BE49-F238E27FC236}">
+                <a16:creationId xmlns:a16="http://schemas.microsoft.com/office/drawing/2014/main" id="{B573E394-6C23-6672-73DF-C212F7A1FFC9}"/>
+              </a:ext>
+            </a:extLst>
+          </p:cNvPr>
+          <p:cNvSpPr/>
+          <p:nvPr/>
+        </p:nvSpPr>
+        <p:spPr>
+          <a:xfrm>
+            <a:off x="1018903" y="3102695"/>
+            <a:ext cx="1156023" cy="281716"/>
+          </a:xfrm>
+          <a:prstGeom prst="rect">
+            <a:avLst/>
+          </a:prstGeom>
+          <a:solidFill>
+            <a:srgbClr val="92D050"/>
+          </a:solidFill>
+          <a:ln>
+            <a:noFill/>
+          </a:ln>
+        </p:spPr>
+        <p:style>
+          <a:lnRef idx="2">
+            <a:schemeClr val="accent1">
+              <a:shade val="15000"/>
+            </a:schemeClr>
+          </a:lnRef>
+          <a:fillRef idx="1">
+            <a:schemeClr val="accent1"/>
+          </a:fillRef>
+          <a:effectRef idx="0">
+            <a:schemeClr val="accent1"/>
+          </a:effectRef>
+          <a:fontRef idx="minor">
+            <a:schemeClr val="lt1"/>
+          </a:fontRef>
+        </p:style>
+        <p:txBody>
+          <a:bodyPr rtlCol="0" anchor="ctr"/>
+          <a:lstStyle/>
+          <a:p>
+            <a:pPr algn="ctr"/>
+            <a:r>
+              <a:rPr lang="en-US" sz="1400" b="1" dirty="0" err="1"/>
+              <a:t>Selesai</a:t>
+            </a:r>
+            <a:endParaRPr lang="en-US" sz="1400" b="1" dirty="0"/>
+          </a:p>
+        </p:txBody>
+      </p:sp>
+      <p:sp>
+        <p:nvSpPr>
+          <p:cNvPr id="87" name="TextBox 86">
+            <a:extLst>
+              <a:ext uri="{FF2B5EF4-FFF2-40B4-BE49-F238E27FC236}">
+                <a16:creationId xmlns:a16="http://schemas.microsoft.com/office/drawing/2014/main" id="{90234479-E1D4-3E12-0EBF-A5496826B23C}"/>
+              </a:ext>
+            </a:extLst>
+          </p:cNvPr>
+          <p:cNvSpPr txBox="1"/>
+          <p:nvPr/>
+        </p:nvSpPr>
+        <p:spPr>
+          <a:xfrm>
+            <a:off x="4158465" y="2931528"/>
+            <a:ext cx="300082" cy="307777"/>
+          </a:xfrm>
+          <a:prstGeom prst="rect">
+            <a:avLst/>
+          </a:prstGeom>
+          <a:noFill/>
+        </p:spPr>
+        <p:txBody>
+          <a:bodyPr wrap="none" rtlCol="0">
+            <a:spAutoFit/>
+          </a:bodyPr>
+          <a:lstStyle/>
+          <a:p>
+            <a:r>
+              <a:rPr lang="en-US" sz="1400" dirty="0"/>
+              <a:t>N</a:t>
+            </a:r>
+          </a:p>
+        </p:txBody>
+      </p:sp>
+      <p:sp>
+        <p:nvSpPr>
+          <p:cNvPr id="88" name="TextBox 87">
+            <a:extLst>
+              <a:ext uri="{FF2B5EF4-FFF2-40B4-BE49-F238E27FC236}">
+                <a16:creationId xmlns:a16="http://schemas.microsoft.com/office/drawing/2014/main" id="{8707C5B1-BD00-3FAE-2DE6-F7444E28813A}"/>
+              </a:ext>
+            </a:extLst>
+          </p:cNvPr>
+          <p:cNvSpPr txBox="1"/>
+          <p:nvPr/>
+        </p:nvSpPr>
+        <p:spPr>
+          <a:xfrm>
+            <a:off x="2521224" y="2936259"/>
+            <a:ext cx="272832" cy="307777"/>
+          </a:xfrm>
+          <a:prstGeom prst="rect">
+            <a:avLst/>
+          </a:prstGeom>
+          <a:noFill/>
+        </p:spPr>
+        <p:txBody>
+          <a:bodyPr wrap="none" rtlCol="0">
+            <a:spAutoFit/>
+          </a:bodyPr>
+          <a:lstStyle/>
+          <a:p>
+            <a:r>
+              <a:rPr lang="en-US" sz="1400" dirty="0"/>
+              <a:t>Y</a:t>
+            </a:r>
+          </a:p>
+        </p:txBody>
+      </p:sp>
     </p:spTree>
     <p:extLst>
       <p:ext uri="{BB962C8B-B14F-4D97-AF65-F5344CB8AC3E}">
@@ -37988,7 +39336,7 @@
             </p:nvSpPr>
             <p:spPr>
               <a:xfrm>
-                <a:off x="6615345" y="5152861"/>
+                <a:off x="6615345" y="5434866"/>
                 <a:ext cx="5092163" cy="923330"/>
               </a:xfrm>
               <a:prstGeom prst="rect">
@@ -38358,7 +39706,7 @@
             </p:nvSpPr>
             <p:spPr>
               <a:xfrm>
-                <a:off x="6615345" y="5152861"/>
+                <a:off x="6615345" y="5434866"/>
                 <a:ext cx="5092163" cy="923330"/>
               </a:xfrm>
               <a:prstGeom prst="rect">
@@ -38367,7 +39715,117 @@
               <a:blipFill>
                 <a:blip r:embed="rId3"/>
                 <a:stretch>
-                  <a:fillRect l="-993" t="-2703" b="-9459"/>
+                  <a:fillRect l="-993" t="-4110" b="-9589"/>
+                </a:stretch>
+              </a:blipFill>
+            </p:spPr>
+            <p:txBody>
+              <a:bodyPr/>
+              <a:lstStyle/>
+              <a:p>
+                <a:r>
+                  <a:rPr lang="en-US">
+                    <a:noFill/>
+                  </a:rPr>
+                  <a:t> </a:t>
+                </a:r>
+              </a:p>
+            </p:txBody>
+          </p:sp>
+        </mc:Fallback>
+      </mc:AlternateContent>
+      <mc:AlternateContent xmlns:mc="http://schemas.openxmlformats.org/markup-compatibility/2006">
+        <mc:Choice xmlns:a14="http://schemas.microsoft.com/office/drawing/2010/main" Requires="a14">
+          <p:sp>
+            <p:nvSpPr>
+              <p:cNvPr id="9" name="TextBox 8">
+                <a:extLst>
+                  <a:ext uri="{FF2B5EF4-FFF2-40B4-BE49-F238E27FC236}">
+                    <a16:creationId xmlns:a16="http://schemas.microsoft.com/office/drawing/2014/main" id="{7A57B8CE-7ABC-6E1B-EF94-1C7A10031E04}"/>
+                  </a:ext>
+                </a:extLst>
+              </p:cNvPr>
+              <p:cNvSpPr txBox="1"/>
+              <p:nvPr/>
+            </p:nvSpPr>
+            <p:spPr>
+              <a:xfrm>
+                <a:off x="6615345" y="5032085"/>
+                <a:ext cx="6096000" cy="369332"/>
+              </a:xfrm>
+              <a:prstGeom prst="rect">
+                <a:avLst/>
+              </a:prstGeom>
+              <a:noFill/>
+            </p:spPr>
+            <p:txBody>
+              <a:bodyPr wrap="square">
+                <a:spAutoFit/>
+              </a:bodyPr>
+              <a:lstStyle/>
+              <a:p>
+                <a:r>
+                  <a:rPr lang="en-US" dirty="0"/>
+                  <a:t>Waktu Running per batch </a:t>
+                </a:r>
+                <a:r>
+                  <a:rPr lang="en-US" dirty="0" err="1"/>
+                  <a:t>adalah</a:t>
+                </a:r>
+                <a:r>
+                  <a:rPr lang="en-US" dirty="0"/>
+                  <a:t> </a:t>
+                </a:r>
+                <a14:m>
+                  <m:oMath xmlns:m="http://schemas.openxmlformats.org/officeDocument/2006/math">
+                    <m:r>
+                      <a:rPr lang="en-US" i="1" smtClean="0">
+                        <a:latin typeface="Cambria Math" panose="02040503050406030204" pitchFamily="18" charset="0"/>
+                        <a:ea typeface="Cambria Math" panose="02040503050406030204" pitchFamily="18" charset="0"/>
+                      </a:rPr>
+                      <m:t>±</m:t>
+                    </m:r>
+                    <m:r>
+                      <m:rPr>
+                        <m:nor/>
+                      </m:rPr>
+                      <a:rPr lang="en-ID"/>
+                      <m:t>3:41:23</m:t>
+                    </m:r>
+                  </m:oMath>
+                </a14:m>
+                <a:endParaRPr lang="en-US" dirty="0"/>
+              </a:p>
+            </p:txBody>
+          </p:sp>
+        </mc:Choice>
+        <mc:Fallback>
+          <p:sp>
+            <p:nvSpPr>
+              <p:cNvPr id="9" name="TextBox 8">
+                <a:extLst>
+                  <a:ext uri="{FF2B5EF4-FFF2-40B4-BE49-F238E27FC236}">
+                    <a16:creationId xmlns:a16="http://schemas.microsoft.com/office/drawing/2014/main" id="{7A57B8CE-7ABC-6E1B-EF94-1C7A10031E04}"/>
+                  </a:ext>
+                </a:extLst>
+              </p:cNvPr>
+              <p:cNvSpPr txBox="1">
+                <a:spLocks noRot="1" noChangeAspect="1" noMove="1" noResize="1" noEditPoints="1" noAdjustHandles="1" noChangeArrowheads="1" noChangeShapeType="1" noTextEdit="1"/>
+              </p:cNvSpPr>
+              <p:nvPr/>
+            </p:nvSpPr>
+            <p:spPr>
+              <a:xfrm>
+                <a:off x="6615345" y="5032085"/>
+                <a:ext cx="6096000" cy="369332"/>
+              </a:xfrm>
+              <a:prstGeom prst="rect">
+                <a:avLst/>
+              </a:prstGeom>
+              <a:blipFill>
+                <a:blip r:embed="rId4"/>
+                <a:stretch>
+                  <a:fillRect l="-832" t="-6667" b="-23333"/>
                 </a:stretch>
               </a:blipFill>
             </p:spPr>
@@ -38854,8 +40312,8 @@
           </a:p>
         </p:txBody>
       </p:sp>
-      <mc:AlternateContent xmlns:mc="http://schemas.openxmlformats.org/markup-compatibility/2006">
-        <mc:Choice xmlns:a14="http://schemas.microsoft.com/office/drawing/2010/main" Requires="a14">
+      <mc:AlternateContent xmlns:mc="http://schemas.openxmlformats.org/markup-compatibility/2006" xmlns:a14="http://schemas.microsoft.com/office/drawing/2010/main">
+        <mc:Choice Requires="a14">
           <p:sp>
             <p:nvSpPr>
               <p:cNvPr id="27" name="TextBox 26">
@@ -39001,7 +40459,7 @@
             </p:txBody>
           </p:sp>
         </mc:Choice>
-        <mc:Fallback>
+        <mc:Fallback xmlns="">
           <p:sp>
             <p:nvSpPr>
               <p:cNvPr id="27" name="TextBox 26">
@@ -39085,8 +40543,8 @@
           </a:p>
         </p:txBody>
       </p:sp>
-      <mc:AlternateContent xmlns:mc="http://schemas.openxmlformats.org/markup-compatibility/2006">
-        <mc:Choice xmlns:a14="http://schemas.microsoft.com/office/drawing/2010/main" Requires="a14">
+      <mc:AlternateContent xmlns:mc="http://schemas.openxmlformats.org/markup-compatibility/2006" xmlns:a14="http://schemas.microsoft.com/office/drawing/2010/main">
+        <mc:Choice Requires="a14">
           <p:sp>
             <p:nvSpPr>
               <p:cNvPr id="29" name="TextBox 28">
@@ -39232,7 +40690,7 @@
             </p:txBody>
           </p:sp>
         </mc:Choice>
-        <mc:Fallback>
+        <mc:Fallback xmlns="">
           <p:sp>
             <p:nvSpPr>
               <p:cNvPr id="29" name="TextBox 28">
@@ -41755,8 +43213,8 @@
           </a:prstGeom>
         </p:spPr>
       </p:pic>
-      <mc:AlternateContent xmlns:mc="http://schemas.openxmlformats.org/markup-compatibility/2006">
-        <mc:Choice xmlns:a14="http://schemas.microsoft.com/office/drawing/2010/main" Requires="a14">
+      <mc:AlternateContent xmlns:mc="http://schemas.openxmlformats.org/markup-compatibility/2006" xmlns:a14="http://schemas.microsoft.com/office/drawing/2010/main">
+        <mc:Choice Requires="a14">
           <p:sp>
             <p:nvSpPr>
               <p:cNvPr id="4" name="TextBox 3">
@@ -41855,7 +43313,7 @@
             </p:txBody>
           </p:sp>
         </mc:Choice>
-        <mc:Fallback>
+        <mc:Fallback xmlns="">
           <p:sp>
             <p:nvSpPr>
               <p:cNvPr id="4" name="TextBox 3">
@@ -41943,8 +43401,8 @@
           </a:p>
         </p:txBody>
       </p:sp>
-      <mc:AlternateContent xmlns:mc="http://schemas.openxmlformats.org/markup-compatibility/2006">
-        <mc:Choice xmlns:a14="http://schemas.microsoft.com/office/drawing/2010/main" Requires="a14">
+      <mc:AlternateContent xmlns:mc="http://schemas.openxmlformats.org/markup-compatibility/2006" xmlns:a14="http://schemas.microsoft.com/office/drawing/2010/main">
+        <mc:Choice Requires="a14">
           <p:sp>
             <p:nvSpPr>
               <p:cNvPr id="7" name="TextBox 6">
@@ -42099,19 +43557,7 @@
                       <a:rPr lang="en-US" b="0" i="1" smtClean="0">
                         <a:latin typeface="Cambria Math" panose="02040503050406030204" pitchFamily="18" charset="0"/>
                       </a:rPr>
-                      <m:t>44.0689 </m:t>
-                    </m:r>
-                    <m:r>
-                      <a:rPr lang="en-US" b="0" i="1" smtClean="0">
-                        <a:latin typeface="Cambria Math" panose="02040503050406030204" pitchFamily="18" charset="0"/>
-                      </a:rPr>
-                      <m:t>,30 ,59.9563</m:t>
-                    </m:r>
-                    <m:r>
-                      <a:rPr lang="en-US" b="0" i="1" smtClean="0">
-                        <a:latin typeface="Cambria Math" panose="02040503050406030204" pitchFamily="18" charset="0"/>
-                      </a:rPr>
-                      <m:t>)</m:t>
+                      <m:t>44.0689 ,30 ,59.9563)</m:t>
                     </m:r>
                   </m:oMath>
                 </a14:m>
@@ -42120,7 +43566,7 @@
             </p:txBody>
           </p:sp>
         </mc:Choice>
-        <mc:Fallback>
+        <mc:Fallback xmlns="">
           <p:sp>
             <p:nvSpPr>
               <p:cNvPr id="7" name="TextBox 6">
@@ -42209,57 +43655,10 @@
       </p:grpSpPr>
       <p:sp>
         <p:nvSpPr>
-          <p:cNvPr id="5" name="Rectangle 4">
-            <a:extLst>
-              <a:ext uri="{FF2B5EF4-FFF2-40B4-BE49-F238E27FC236}">
-                <a16:creationId xmlns:a16="http://schemas.microsoft.com/office/drawing/2014/main" id="{C07E61D7-731A-A153-0405-092C9AB7202E}"/>
-              </a:ext>
-            </a:extLst>
-          </p:cNvPr>
-          <p:cNvSpPr/>
-          <p:nvPr/>
-        </p:nvSpPr>
-        <p:spPr>
-          <a:xfrm>
-            <a:off x="495300" y="0"/>
-            <a:ext cx="11696700" cy="1925618"/>
-          </a:xfrm>
-          <a:prstGeom prst="rect">
-            <a:avLst/>
-          </a:prstGeom>
-          <a:ln>
-            <a:noFill/>
-          </a:ln>
-        </p:spPr>
-        <p:style>
-          <a:lnRef idx="2">
-            <a:schemeClr val="accent6"/>
-          </a:lnRef>
-          <a:fillRef idx="1">
-            <a:schemeClr val="lt1"/>
-          </a:fillRef>
-          <a:effectRef idx="0">
-            <a:schemeClr val="accent6"/>
-          </a:effectRef>
-          <a:fontRef idx="minor">
-            <a:schemeClr val="dk1"/>
-          </a:fontRef>
-        </p:style>
-        <p:txBody>
-          <a:bodyPr rtlCol="0" anchor="ctr"/>
-          <a:lstStyle/>
-          <a:p>
-            <a:pPr algn="ctr"/>
-            <a:endParaRPr lang="en-US"/>
-          </a:p>
-        </p:txBody>
-      </p:sp>
-      <p:sp>
-        <p:nvSpPr>
-          <p:cNvPr id="2" name="Title 1">
-            <a:extLst>
-              <a:ext uri="{FF2B5EF4-FFF2-40B4-BE49-F238E27FC236}">
-                <a16:creationId xmlns:a16="http://schemas.microsoft.com/office/drawing/2014/main" id="{F8EBD7C9-03A3-A999-4A30-985ECCEA0335}"/>
+          <p:cNvPr id="23" name="Title 1">
+            <a:extLst>
+              <a:ext uri="{FF2B5EF4-FFF2-40B4-BE49-F238E27FC236}">
+                <a16:creationId xmlns:a16="http://schemas.microsoft.com/office/drawing/2014/main" id="{7AF92C76-E679-B496-FD1E-71F34B637989}"/>
               </a:ext>
             </a:extLst>
           </p:cNvPr>
@@ -42270,17 +43669,22 @@
             <p:ph type="title"/>
           </p:nvPr>
         </p:nvSpPr>
-        <p:spPr/>
+        <p:spPr>
+          <a:xfrm>
+            <a:off x="838200" y="365125"/>
+            <a:ext cx="10515600" cy="1325563"/>
+          </a:xfrm>
+        </p:spPr>
         <p:txBody>
           <a:bodyPr/>
           <a:lstStyle/>
           <a:p>
             <a:r>
-              <a:rPr lang="en-US" b="1" dirty="0" err="1">
+              <a:rPr lang="en-US" b="1" dirty="0">
                 <a:latin typeface="Calibri" panose="020F0502020204030204" pitchFamily="34" charset="0"/>
                 <a:cs typeface="Calibri" panose="020F0502020204030204" pitchFamily="34" charset="0"/>
               </a:rPr>
-              <a:t>Referensi</a:t>
+              <a:t>Kesimpulan</a:t>
             </a:r>
             <a:endParaRPr lang="en-US" b="1" dirty="0">
               <a:solidFill>
@@ -42294,10 +43698,118 @@
       </p:sp>
       <p:sp>
         <p:nvSpPr>
-          <p:cNvPr id="9" name="TextBox 8">
-            <a:extLst>
-              <a:ext uri="{FF2B5EF4-FFF2-40B4-BE49-F238E27FC236}">
-                <a16:creationId xmlns:a16="http://schemas.microsoft.com/office/drawing/2014/main" id="{D0012563-9F13-1D04-1F99-2D0A2DD84381}"/>
+          <p:cNvPr id="24" name="Rectangle 23">
+            <a:extLst>
+              <a:ext uri="{FF2B5EF4-FFF2-40B4-BE49-F238E27FC236}">
+                <a16:creationId xmlns:a16="http://schemas.microsoft.com/office/drawing/2014/main" id="{17376562-E6B2-3EFA-1AD3-0B67869903AC}"/>
+              </a:ext>
+            </a:extLst>
+          </p:cNvPr>
+          <p:cNvSpPr/>
+          <p:nvPr/>
+        </p:nvSpPr>
+        <p:spPr>
+          <a:xfrm>
+            <a:off x="705394" y="744877"/>
+            <a:ext cx="69669" cy="566057"/>
+          </a:xfrm>
+          <a:prstGeom prst="rect">
+            <a:avLst/>
+          </a:prstGeom>
+          <a:solidFill>
+            <a:srgbClr val="92D050"/>
+          </a:solidFill>
+          <a:ln>
+            <a:noFill/>
+          </a:ln>
+        </p:spPr>
+        <p:style>
+          <a:lnRef idx="2">
+            <a:schemeClr val="accent1">
+              <a:shade val="15000"/>
+            </a:schemeClr>
+          </a:lnRef>
+          <a:fillRef idx="1">
+            <a:schemeClr val="accent1"/>
+          </a:fillRef>
+          <a:effectRef idx="0">
+            <a:schemeClr val="accent1"/>
+          </a:effectRef>
+          <a:fontRef idx="minor">
+            <a:schemeClr val="lt1"/>
+          </a:fontRef>
+        </p:style>
+        <p:txBody>
+          <a:bodyPr rtlCol="0" anchor="ctr"/>
+          <a:lstStyle/>
+          <a:p>
+            <a:pPr algn="ctr"/>
+            <a:endParaRPr lang="en-US">
+              <a:solidFill>
+                <a:srgbClr val="00B050"/>
+              </a:solidFill>
+            </a:endParaRPr>
+          </a:p>
+        </p:txBody>
+      </p:sp>
+      <p:sp>
+        <p:nvSpPr>
+          <p:cNvPr id="25" name="Rectangle 24">
+            <a:extLst>
+              <a:ext uri="{FF2B5EF4-FFF2-40B4-BE49-F238E27FC236}">
+                <a16:creationId xmlns:a16="http://schemas.microsoft.com/office/drawing/2014/main" id="{1FBC2379-9EB6-77AD-051A-4E7EAE5A68B3}"/>
+              </a:ext>
+            </a:extLst>
+          </p:cNvPr>
+          <p:cNvSpPr/>
+          <p:nvPr/>
+        </p:nvSpPr>
+        <p:spPr>
+          <a:xfrm>
+            <a:off x="0" y="6653349"/>
+            <a:ext cx="12192000" cy="204651"/>
+          </a:xfrm>
+          <a:prstGeom prst="rect">
+            <a:avLst/>
+          </a:prstGeom>
+          <a:solidFill>
+            <a:srgbClr val="92D050"/>
+          </a:solidFill>
+          <a:ln>
+            <a:noFill/>
+          </a:ln>
+        </p:spPr>
+        <p:style>
+          <a:lnRef idx="2">
+            <a:schemeClr val="accent1">
+              <a:shade val="15000"/>
+            </a:schemeClr>
+          </a:lnRef>
+          <a:fillRef idx="1">
+            <a:schemeClr val="accent1"/>
+          </a:fillRef>
+          <a:effectRef idx="0">
+            <a:schemeClr val="accent1"/>
+          </a:effectRef>
+          <a:fontRef idx="minor">
+            <a:schemeClr val="lt1"/>
+          </a:fontRef>
+        </p:style>
+        <p:txBody>
+          <a:bodyPr rtlCol="0" anchor="ctr"/>
+          <a:lstStyle/>
+          <a:p>
+            <a:pPr algn="ctr"/>
+            <a:endParaRPr lang="en-US"/>
+          </a:p>
+        </p:txBody>
+      </p:sp>
+      <p:sp>
+        <p:nvSpPr>
+          <p:cNvPr id="2" name="TextBox 1">
+            <a:extLst>
+              <a:ext uri="{FF2B5EF4-FFF2-40B4-BE49-F238E27FC236}">
+                <a16:creationId xmlns:a16="http://schemas.microsoft.com/office/drawing/2014/main" id="{B23E4906-3854-FF6D-6BB9-6FEC9AACA6E6}"/>
               </a:ext>
             </a:extLst>
           </p:cNvPr>
@@ -42306,8 +43818,8 @@
         </p:nvSpPr>
         <p:spPr>
           <a:xfrm>
-            <a:off x="838201" y="1983455"/>
-            <a:ext cx="10019189" cy="923330"/>
+            <a:off x="583474" y="1744527"/>
+            <a:ext cx="10700657" cy="369332"/>
           </a:xfrm>
           <a:prstGeom prst="rect">
             <a:avLst/>
@@ -42321,6 +43833,739 @@
           <a:lstStyle/>
           <a:p>
             <a:r>
+              <a:rPr lang="en-US" dirty="0"/>
+              <a:t>Kesimpulan </a:t>
+            </a:r>
+            <a:r>
+              <a:rPr lang="en-US" dirty="0" err="1"/>
+              <a:t>dari</a:t>
+            </a:r>
+            <a:r>
+              <a:rPr lang="en-US" dirty="0"/>
+              <a:t> </a:t>
+            </a:r>
+            <a:r>
+              <a:rPr lang="en-US" dirty="0" err="1"/>
+              <a:t>Optimisasi</a:t>
+            </a:r>
+            <a:r>
+              <a:rPr lang="en-US" dirty="0"/>
+              <a:t> Graph Partitioning </a:t>
+            </a:r>
+            <a:r>
+              <a:rPr lang="en-US" dirty="0" err="1"/>
+              <a:t>dengan</a:t>
+            </a:r>
+            <a:r>
+              <a:rPr lang="en-US" dirty="0"/>
+              <a:t> </a:t>
+            </a:r>
+            <a:r>
+              <a:rPr lang="en-US" dirty="0" err="1"/>
+              <a:t>optimisasi</a:t>
+            </a:r>
+            <a:r>
+              <a:rPr lang="en-US" dirty="0"/>
+              <a:t> </a:t>
+            </a:r>
+            <a:r>
+              <a:rPr lang="en-US" dirty="0" err="1"/>
+              <a:t>multiobjektif</a:t>
+            </a:r>
+            <a:r>
+              <a:rPr lang="en-US" dirty="0"/>
+              <a:t> </a:t>
+            </a:r>
+            <a:r>
+              <a:rPr lang="en-US" dirty="0" err="1"/>
+              <a:t>adalah</a:t>
+            </a:r>
+            <a:endParaRPr lang="en-US" dirty="0"/>
+          </a:p>
+        </p:txBody>
+      </p:sp>
+      <p:sp>
+        <p:nvSpPr>
+          <p:cNvPr id="8" name="TextBox 7">
+            <a:extLst>
+              <a:ext uri="{FF2B5EF4-FFF2-40B4-BE49-F238E27FC236}">
+                <a16:creationId xmlns:a16="http://schemas.microsoft.com/office/drawing/2014/main" id="{360DE02B-B3A8-507F-E0C9-9431CD1DDA34}"/>
+              </a:ext>
+            </a:extLst>
+          </p:cNvPr>
+          <p:cNvSpPr txBox="1"/>
+          <p:nvPr/>
+        </p:nvSpPr>
+        <p:spPr>
+          <a:xfrm>
+            <a:off x="705394" y="2228671"/>
+            <a:ext cx="8220892" cy="2031325"/>
+          </a:xfrm>
+          <a:prstGeom prst="rect">
+            <a:avLst/>
+          </a:prstGeom>
+          <a:noFill/>
+        </p:spPr>
+        <p:txBody>
+          <a:bodyPr wrap="square">
+            <a:spAutoFit/>
+          </a:bodyPr>
+          <a:lstStyle/>
+          <a:p>
+            <a:pPr marL="342900" indent="-342900">
+              <a:buAutoNum type="arabicPeriod"/>
+            </a:pPr>
+            <a:r>
+              <a:rPr lang="en-US" dirty="0" err="1"/>
+              <a:t>Algoritma</a:t>
+            </a:r>
+            <a:r>
+              <a:rPr lang="en-US" dirty="0"/>
+              <a:t> yang </a:t>
+            </a:r>
+            <a:r>
+              <a:rPr lang="en-US" dirty="0" err="1"/>
+              <a:t>dikembangkan</a:t>
+            </a:r>
+            <a:r>
+              <a:rPr lang="en-US" dirty="0"/>
+              <a:t> </a:t>
+            </a:r>
+            <a:r>
+              <a:rPr lang="en-US" dirty="0" err="1"/>
+              <a:t>dapat</a:t>
+            </a:r>
+            <a:r>
+              <a:rPr lang="en-US" dirty="0"/>
+              <a:t> </a:t>
+            </a:r>
+            <a:r>
+              <a:rPr lang="en-US" dirty="0" err="1"/>
+              <a:t>menerima</a:t>
+            </a:r>
+            <a:r>
+              <a:rPr lang="en-US" dirty="0"/>
+              <a:t> </a:t>
+            </a:r>
+            <a:r>
+              <a:rPr lang="en-US" dirty="0" err="1"/>
+              <a:t>masukkan</a:t>
+            </a:r>
+            <a:r>
+              <a:rPr lang="en-US" dirty="0"/>
+              <a:t> </a:t>
+            </a:r>
+            <a:r>
+              <a:rPr lang="en-US" dirty="0" err="1"/>
+              <a:t>berupa</a:t>
+            </a:r>
+            <a:r>
+              <a:rPr lang="en-US" dirty="0"/>
+              <a:t> </a:t>
+            </a:r>
+            <a:r>
+              <a:rPr lang="en-US" dirty="0" err="1"/>
+              <a:t>titik</a:t>
+            </a:r>
+            <a:r>
+              <a:rPr lang="en-US" dirty="0"/>
+              <a:t> pada </a:t>
+            </a:r>
+            <a:r>
+              <a:rPr lang="en-US" dirty="0" err="1"/>
+              <a:t>bidang</a:t>
+            </a:r>
+            <a:r>
+              <a:rPr lang="en-US" dirty="0"/>
+              <a:t> 2 </a:t>
+            </a:r>
+            <a:r>
+              <a:rPr lang="en-US" dirty="0" err="1"/>
+              <a:t>dimensi</a:t>
+            </a:r>
+            <a:r>
+              <a:rPr lang="en-US" dirty="0"/>
+              <a:t> dan meng</a:t>
+            </a:r>
+            <a:r>
+              <a:rPr lang="en-US" i="1" dirty="0"/>
+              <a:t>-generate </a:t>
+            </a:r>
+            <a:r>
+              <a:rPr lang="en-US" dirty="0"/>
+              <a:t>graph yang </a:t>
+            </a:r>
+            <a:r>
+              <a:rPr lang="en-US" dirty="0" err="1"/>
+              <a:t>diperlukan</a:t>
+            </a:r>
+            <a:r>
+              <a:rPr lang="en-US" dirty="0"/>
+              <a:t> agar </a:t>
+            </a:r>
+            <a:r>
+              <a:rPr lang="en-US" dirty="0" err="1"/>
+              <a:t>dapat</a:t>
+            </a:r>
+            <a:r>
+              <a:rPr lang="en-US" dirty="0"/>
+              <a:t> </a:t>
+            </a:r>
+            <a:r>
+              <a:rPr lang="en-US" dirty="0" err="1"/>
+              <a:t>dilakukan</a:t>
+            </a:r>
+            <a:r>
+              <a:rPr lang="en-US" dirty="0"/>
+              <a:t> proses </a:t>
+            </a:r>
+            <a:r>
+              <a:rPr lang="en-US" dirty="0" err="1"/>
+              <a:t>optimisasi</a:t>
+            </a:r>
+            <a:r>
+              <a:rPr lang="en-US" dirty="0"/>
+              <a:t> </a:t>
+            </a:r>
+            <a:r>
+              <a:rPr lang="en-US" i="1" dirty="0"/>
+              <a:t>Graph Partitioning</a:t>
+            </a:r>
+          </a:p>
+          <a:p>
+            <a:pPr marL="342900" indent="-342900">
+              <a:buAutoNum type="arabicPeriod"/>
+            </a:pPr>
+            <a:r>
+              <a:rPr lang="en-US" dirty="0"/>
+              <a:t>NSGA II </a:t>
+            </a:r>
+            <a:r>
+              <a:rPr lang="en-US" dirty="0" err="1"/>
+              <a:t>mampu</a:t>
+            </a:r>
+            <a:r>
+              <a:rPr lang="en-US" dirty="0"/>
+              <a:t> </a:t>
+            </a:r>
+            <a:r>
+              <a:rPr lang="en-US" dirty="0" err="1"/>
+              <a:t>dengan</a:t>
+            </a:r>
+            <a:r>
+              <a:rPr lang="en-US" dirty="0"/>
+              <a:t> </a:t>
+            </a:r>
+            <a:r>
+              <a:rPr lang="en-US" dirty="0" err="1"/>
+              <a:t>baik</a:t>
+            </a:r>
+            <a:r>
+              <a:rPr lang="en-US" dirty="0"/>
+              <a:t> </a:t>
+            </a:r>
+            <a:r>
+              <a:rPr lang="en-US" dirty="0" err="1"/>
+              <a:t>melakukan</a:t>
+            </a:r>
+            <a:r>
+              <a:rPr lang="en-US" dirty="0"/>
+              <a:t> </a:t>
+            </a:r>
+            <a:r>
+              <a:rPr lang="en-US" dirty="0" err="1"/>
+              <a:t>optimisasi</a:t>
+            </a:r>
+            <a:r>
+              <a:rPr lang="en-US" dirty="0"/>
+              <a:t> </a:t>
+            </a:r>
+            <a:r>
+              <a:rPr lang="en-US" i="1" dirty="0"/>
+              <a:t>Graph Partitioning</a:t>
+            </a:r>
+            <a:r>
+              <a:rPr lang="en-US" dirty="0"/>
+              <a:t>, proses yang </a:t>
+            </a:r>
+            <a:r>
+              <a:rPr lang="en-US" dirty="0" err="1"/>
+              <a:t>dilakukan</a:t>
+            </a:r>
+            <a:r>
+              <a:rPr lang="en-US" dirty="0"/>
+              <a:t> sangat </a:t>
+            </a:r>
+            <a:r>
+              <a:rPr lang="en-US" i="1" dirty="0"/>
+              <a:t>computationally heavy.</a:t>
+            </a:r>
+          </a:p>
+          <a:p>
+            <a:pPr marL="342900" indent="-342900">
+              <a:buAutoNum type="arabicPeriod"/>
+            </a:pPr>
+            <a:r>
+              <a:rPr lang="en-US" dirty="0"/>
+              <a:t>Proses </a:t>
+            </a:r>
+            <a:r>
+              <a:rPr lang="en-US" dirty="0" err="1"/>
+              <a:t>optimisasi</a:t>
+            </a:r>
+            <a:r>
+              <a:rPr lang="en-US" dirty="0"/>
+              <a:t> juga </a:t>
+            </a:r>
+            <a:r>
+              <a:rPr lang="en-US" dirty="0" err="1"/>
+              <a:t>dapat</a:t>
+            </a:r>
+            <a:r>
+              <a:rPr lang="en-US" dirty="0"/>
+              <a:t> </a:t>
+            </a:r>
+            <a:r>
+              <a:rPr lang="en-US" dirty="0" err="1"/>
+              <a:t>dilakukan</a:t>
+            </a:r>
+            <a:r>
+              <a:rPr lang="en-US" dirty="0"/>
+              <a:t> </a:t>
+            </a:r>
+            <a:r>
+              <a:rPr lang="en-US" dirty="0" err="1"/>
+              <a:t>secara</a:t>
+            </a:r>
+            <a:r>
+              <a:rPr lang="en-US" dirty="0"/>
+              <a:t> </a:t>
+            </a:r>
+            <a:r>
+              <a:rPr lang="en-US" dirty="0" err="1"/>
+              <a:t>interaktif</a:t>
+            </a:r>
+            <a:r>
+              <a:rPr lang="en-US" dirty="0"/>
+              <a:t> </a:t>
+            </a:r>
+            <a:r>
+              <a:rPr lang="en-US" dirty="0" err="1"/>
+              <a:t>menggunakan</a:t>
+            </a:r>
+            <a:r>
+              <a:rPr lang="en-US" dirty="0"/>
+              <a:t> NAUTILUS Navigator yang </a:t>
+            </a:r>
+            <a:r>
+              <a:rPr lang="en-US" dirty="0" err="1"/>
+              <a:t>dikembangkan</a:t>
+            </a:r>
+            <a:r>
+              <a:rPr lang="en-US" dirty="0"/>
+              <a:t> oleh DESDEO </a:t>
+            </a:r>
+            <a:r>
+              <a:rPr lang="en-US" dirty="0" err="1"/>
+              <a:t>dalam</a:t>
+            </a:r>
+            <a:r>
+              <a:rPr lang="en-US" dirty="0"/>
+              <a:t> </a:t>
+            </a:r>
+            <a:r>
+              <a:rPr lang="en-US" dirty="0" err="1"/>
+              <a:t>bahasa</a:t>
+            </a:r>
+            <a:r>
+              <a:rPr lang="en-US" dirty="0"/>
+              <a:t> </a:t>
+            </a:r>
+            <a:r>
+              <a:rPr lang="en-US" dirty="0" err="1"/>
+              <a:t>pemrograman</a:t>
+            </a:r>
+            <a:r>
+              <a:rPr lang="en-US" dirty="0"/>
+              <a:t> Python</a:t>
+            </a:r>
+          </a:p>
+        </p:txBody>
+      </p:sp>
+    </p:spTree>
+    <p:extLst>
+      <p:ext uri="{BB962C8B-B14F-4D97-AF65-F5344CB8AC3E}">
+        <p14:creationId xmlns:p14="http://schemas.microsoft.com/office/powerpoint/2010/main" val="168565025"/>
+      </p:ext>
+    </p:extLst>
+  </p:cSld>
+  <p:clrMapOvr>
+    <a:masterClrMapping/>
+  </p:clrMapOvr>
+  <mc:AlternateContent xmlns:mc="http://schemas.openxmlformats.org/markup-compatibility/2006" xmlns:p159="http://schemas.microsoft.com/office/powerpoint/2015/09/main">
+    <mc:Choice Requires="p159">
+      <p:transition xmlns:p14="http://schemas.microsoft.com/office/powerpoint/2010/main" p14:dur="250">
+        <p159:morph option="byObject"/>
+      </p:transition>
+    </mc:Choice>
+    <mc:Fallback xmlns="">
+      <p:transition>
+        <p:fade/>
+      </p:transition>
+    </mc:Fallback>
+  </mc:AlternateContent>
+</p:sld>
+</file>
+
+<file path=ppt/slides/slide42.xml><?xml version="1.0" encoding="utf-8"?>
+<p:sld xmlns:a="http://schemas.openxmlformats.org/drawingml/2006/main" xmlns:r="http://schemas.openxmlformats.org/officeDocument/2006/relationships" xmlns:p="http://schemas.openxmlformats.org/presentationml/2006/main">
+  <p:cSld>
+    <p:spTree>
+      <p:nvGrpSpPr>
+        <p:cNvPr id="1" name=""/>
+        <p:cNvGrpSpPr/>
+        <p:nvPr/>
+      </p:nvGrpSpPr>
+      <p:grpSpPr>
+        <a:xfrm>
+          <a:off x="0" y="0"/>
+          <a:ext cx="0" cy="0"/>
+          <a:chOff x="0" y="0"/>
+          <a:chExt cx="0" cy="0"/>
+        </a:xfrm>
+      </p:grpSpPr>
+      <p:sp>
+        <p:nvSpPr>
+          <p:cNvPr id="25" name="Rectangle 24">
+            <a:extLst>
+              <a:ext uri="{FF2B5EF4-FFF2-40B4-BE49-F238E27FC236}">
+                <a16:creationId xmlns:a16="http://schemas.microsoft.com/office/drawing/2014/main" id="{1FBC2379-9EB6-77AD-051A-4E7EAE5A68B3}"/>
+              </a:ext>
+            </a:extLst>
+          </p:cNvPr>
+          <p:cNvSpPr/>
+          <p:nvPr/>
+        </p:nvSpPr>
+        <p:spPr>
+          <a:xfrm>
+            <a:off x="0" y="6653349"/>
+            <a:ext cx="12192000" cy="204651"/>
+          </a:xfrm>
+          <a:prstGeom prst="rect">
+            <a:avLst/>
+          </a:prstGeom>
+          <a:solidFill>
+            <a:srgbClr val="92D050"/>
+          </a:solidFill>
+          <a:ln>
+            <a:noFill/>
+          </a:ln>
+        </p:spPr>
+        <p:style>
+          <a:lnRef idx="2">
+            <a:schemeClr val="accent1">
+              <a:shade val="15000"/>
+            </a:schemeClr>
+          </a:lnRef>
+          <a:fillRef idx="1">
+            <a:schemeClr val="accent1"/>
+          </a:fillRef>
+          <a:effectRef idx="0">
+            <a:schemeClr val="accent1"/>
+          </a:effectRef>
+          <a:fontRef idx="minor">
+            <a:schemeClr val="lt1"/>
+          </a:fontRef>
+        </p:style>
+        <p:txBody>
+          <a:bodyPr rtlCol="0" anchor="ctr"/>
+          <a:lstStyle/>
+          <a:p>
+            <a:pPr algn="ctr"/>
+            <a:endParaRPr lang="en-US"/>
+          </a:p>
+        </p:txBody>
+      </p:sp>
+      <p:sp>
+        <p:nvSpPr>
+          <p:cNvPr id="3" name="TextBox 2">
+            <a:extLst>
+              <a:ext uri="{FF2B5EF4-FFF2-40B4-BE49-F238E27FC236}">
+                <a16:creationId xmlns:a16="http://schemas.microsoft.com/office/drawing/2014/main" id="{70C9340E-8A33-7A34-4A24-3612E6D8127E}"/>
+              </a:ext>
+            </a:extLst>
+          </p:cNvPr>
+          <p:cNvSpPr txBox="1"/>
+          <p:nvPr/>
+        </p:nvSpPr>
+        <p:spPr>
+          <a:xfrm>
+            <a:off x="3625740" y="2542903"/>
+            <a:ext cx="4940520" cy="369332"/>
+          </a:xfrm>
+          <a:prstGeom prst="rect">
+            <a:avLst/>
+          </a:prstGeom>
+          <a:noFill/>
+        </p:spPr>
+        <p:txBody>
+          <a:bodyPr wrap="none" rtlCol="0">
+            <a:spAutoFit/>
+          </a:bodyPr>
+          <a:lstStyle/>
+          <a:p>
+            <a:r>
+              <a:rPr lang="en-US" dirty="0"/>
+              <a:t>Code </a:t>
+            </a:r>
+            <a:r>
+              <a:rPr lang="en-US" dirty="0" err="1"/>
+              <a:t>lengkap</a:t>
+            </a:r>
+            <a:r>
+              <a:rPr lang="en-US" dirty="0"/>
+              <a:t> </a:t>
+            </a:r>
+            <a:r>
+              <a:rPr lang="en-US" dirty="0" err="1"/>
+              <a:t>dapat</a:t>
+            </a:r>
+            <a:r>
+              <a:rPr lang="en-US" dirty="0"/>
+              <a:t> </a:t>
+            </a:r>
+            <a:r>
+              <a:rPr lang="en-US" dirty="0" err="1"/>
+              <a:t>dilihat</a:t>
+            </a:r>
+            <a:r>
+              <a:rPr lang="en-US" dirty="0"/>
+              <a:t> pada </a:t>
+            </a:r>
+            <a:r>
+              <a:rPr lang="en-US" dirty="0" err="1"/>
+              <a:t>laman</a:t>
+            </a:r>
+            <a:r>
+              <a:rPr lang="en-US" dirty="0"/>
+              <a:t> </a:t>
+            </a:r>
+            <a:r>
+              <a:rPr lang="en-US" dirty="0" err="1"/>
+              <a:t>berikut</a:t>
+            </a:r>
+            <a:r>
+              <a:rPr lang="en-US" dirty="0"/>
+              <a:t> </a:t>
+            </a:r>
+            <a:r>
+              <a:rPr lang="en-US" dirty="0" err="1"/>
+              <a:t>ini</a:t>
+            </a:r>
+            <a:endParaRPr lang="en-US" dirty="0"/>
+          </a:p>
+        </p:txBody>
+      </p:sp>
+      <p:sp>
+        <p:nvSpPr>
+          <p:cNvPr id="5" name="TextBox 4">
+            <a:extLst>
+              <a:ext uri="{FF2B5EF4-FFF2-40B4-BE49-F238E27FC236}">
+                <a16:creationId xmlns:a16="http://schemas.microsoft.com/office/drawing/2014/main" id="{FEC7919F-5669-0C25-993A-8098BDCC0A35}"/>
+              </a:ext>
+            </a:extLst>
+          </p:cNvPr>
+          <p:cNvSpPr txBox="1"/>
+          <p:nvPr/>
+        </p:nvSpPr>
+        <p:spPr>
+          <a:xfrm>
+            <a:off x="3048000" y="2912235"/>
+            <a:ext cx="6096000" cy="1077218"/>
+          </a:xfrm>
+          <a:prstGeom prst="rect">
+            <a:avLst/>
+          </a:prstGeom>
+          <a:noFill/>
+        </p:spPr>
+        <p:txBody>
+          <a:bodyPr wrap="square">
+            <a:spAutoFit/>
+          </a:bodyPr>
+          <a:lstStyle/>
+          <a:p>
+            <a:pPr algn="ctr"/>
+            <a:r>
+              <a:rPr lang="en-US" sz="3200" b="1" dirty="0"/>
+              <a:t>http://</a:t>
+            </a:r>
+            <a:r>
+              <a:rPr lang="en-US" sz="3200" b="1" dirty="0" err="1"/>
+              <a:t>bit.ly</a:t>
+            </a:r>
+            <a:r>
+              <a:rPr lang="en-US" sz="3200" b="1" dirty="0"/>
+              <a:t>/graph-partitioning-nsga-2</a:t>
+            </a:r>
+          </a:p>
+        </p:txBody>
+      </p:sp>
+    </p:spTree>
+    <p:extLst>
+      <p:ext uri="{BB962C8B-B14F-4D97-AF65-F5344CB8AC3E}">
+        <p14:creationId xmlns:p14="http://schemas.microsoft.com/office/powerpoint/2010/main" val="1013541123"/>
+      </p:ext>
+    </p:extLst>
+  </p:cSld>
+  <p:clrMapOvr>
+    <a:masterClrMapping/>
+  </p:clrMapOvr>
+  <mc:AlternateContent xmlns:mc="http://schemas.openxmlformats.org/markup-compatibility/2006" xmlns:p159="http://schemas.microsoft.com/office/powerpoint/2015/09/main">
+    <mc:Choice Requires="p159">
+      <p:transition xmlns:p14="http://schemas.microsoft.com/office/powerpoint/2010/main" p14:dur="250">
+        <p159:morph option="byObject"/>
+      </p:transition>
+    </mc:Choice>
+    <mc:Fallback xmlns="">
+      <p:transition>
+        <p:fade/>
+      </p:transition>
+    </mc:Fallback>
+  </mc:AlternateContent>
+</p:sld>
+</file>
+
+<file path=ppt/slides/slide43.xml><?xml version="1.0" encoding="utf-8"?>
+<p:sld xmlns:a="http://schemas.openxmlformats.org/drawingml/2006/main" xmlns:r="http://schemas.openxmlformats.org/officeDocument/2006/relationships" xmlns:p="http://schemas.openxmlformats.org/presentationml/2006/main">
+  <p:cSld>
+    <p:spTree>
+      <p:nvGrpSpPr>
+        <p:cNvPr id="1" name=""/>
+        <p:cNvGrpSpPr/>
+        <p:nvPr/>
+      </p:nvGrpSpPr>
+      <p:grpSpPr>
+        <a:xfrm>
+          <a:off x="0" y="0"/>
+          <a:ext cx="0" cy="0"/>
+          <a:chOff x="0" y="0"/>
+          <a:chExt cx="0" cy="0"/>
+        </a:xfrm>
+      </p:grpSpPr>
+      <p:sp>
+        <p:nvSpPr>
+          <p:cNvPr id="5" name="Rectangle 4">
+            <a:extLst>
+              <a:ext uri="{FF2B5EF4-FFF2-40B4-BE49-F238E27FC236}">
+                <a16:creationId xmlns:a16="http://schemas.microsoft.com/office/drawing/2014/main" id="{C07E61D7-731A-A153-0405-092C9AB7202E}"/>
+              </a:ext>
+            </a:extLst>
+          </p:cNvPr>
+          <p:cNvSpPr/>
+          <p:nvPr/>
+        </p:nvSpPr>
+        <p:spPr>
+          <a:xfrm>
+            <a:off x="495300" y="0"/>
+            <a:ext cx="11696700" cy="1925618"/>
+          </a:xfrm>
+          <a:prstGeom prst="rect">
+            <a:avLst/>
+          </a:prstGeom>
+          <a:ln>
+            <a:noFill/>
+          </a:ln>
+        </p:spPr>
+        <p:style>
+          <a:lnRef idx="2">
+            <a:schemeClr val="accent6"/>
+          </a:lnRef>
+          <a:fillRef idx="1">
+            <a:schemeClr val="lt1"/>
+          </a:fillRef>
+          <a:effectRef idx="0">
+            <a:schemeClr val="accent6"/>
+          </a:effectRef>
+          <a:fontRef idx="minor">
+            <a:schemeClr val="dk1"/>
+          </a:fontRef>
+        </p:style>
+        <p:txBody>
+          <a:bodyPr rtlCol="0" anchor="ctr"/>
+          <a:lstStyle/>
+          <a:p>
+            <a:pPr algn="ctr"/>
+            <a:endParaRPr lang="en-US"/>
+          </a:p>
+        </p:txBody>
+      </p:sp>
+      <p:sp>
+        <p:nvSpPr>
+          <p:cNvPr id="2" name="Title 1">
+            <a:extLst>
+              <a:ext uri="{FF2B5EF4-FFF2-40B4-BE49-F238E27FC236}">
+                <a16:creationId xmlns:a16="http://schemas.microsoft.com/office/drawing/2014/main" id="{F8EBD7C9-03A3-A999-4A30-985ECCEA0335}"/>
+              </a:ext>
+            </a:extLst>
+          </p:cNvPr>
+          <p:cNvSpPr>
+            <a:spLocks noGrp="1"/>
+          </p:cNvSpPr>
+          <p:nvPr>
+            <p:ph type="title"/>
+          </p:nvPr>
+        </p:nvSpPr>
+        <p:spPr/>
+        <p:txBody>
+          <a:bodyPr/>
+          <a:lstStyle/>
+          <a:p>
+            <a:r>
+              <a:rPr lang="en-US" b="1" dirty="0" err="1">
+                <a:latin typeface="Calibri" panose="020F0502020204030204" pitchFamily="34" charset="0"/>
+                <a:cs typeface="Calibri" panose="020F0502020204030204" pitchFamily="34" charset="0"/>
+              </a:rPr>
+              <a:t>Referensi</a:t>
+            </a:r>
+            <a:endParaRPr lang="en-US" b="1" dirty="0">
+              <a:solidFill>
+                <a:srgbClr val="00B0F0"/>
+              </a:solidFill>
+              <a:latin typeface="Calibri" panose="020F0502020204030204" pitchFamily="34" charset="0"/>
+              <a:cs typeface="Calibri" panose="020F0502020204030204" pitchFamily="34" charset="0"/>
+            </a:endParaRPr>
+          </a:p>
+        </p:txBody>
+      </p:sp>
+      <p:sp>
+        <p:nvSpPr>
+          <p:cNvPr id="9" name="TextBox 8">
+            <a:extLst>
+              <a:ext uri="{FF2B5EF4-FFF2-40B4-BE49-F238E27FC236}">
+                <a16:creationId xmlns:a16="http://schemas.microsoft.com/office/drawing/2014/main" id="{D0012563-9F13-1D04-1F99-2D0A2DD84381}"/>
+              </a:ext>
+            </a:extLst>
+          </p:cNvPr>
+          <p:cNvSpPr txBox="1"/>
+          <p:nvPr/>
+        </p:nvSpPr>
+        <p:spPr>
+          <a:xfrm>
+            <a:off x="705394" y="1865682"/>
+            <a:ext cx="10019189" cy="1754326"/>
+          </a:xfrm>
+          <a:prstGeom prst="rect">
+            <a:avLst/>
+          </a:prstGeom>
+          <a:noFill/>
+        </p:spPr>
+        <p:txBody>
+          <a:bodyPr wrap="square" rtlCol="0">
+            <a:spAutoFit/>
+          </a:bodyPr>
+          <a:lstStyle/>
+          <a:p>
+            <a:r>
               <a:rPr lang="en-US" b="1" dirty="0"/>
               <a:t>[1] </a:t>
             </a:r>
@@ -42344,6 +44589,34 @@
               <a:rPr lang="en-US" dirty="0"/>
               <a:t>, José &amp; Fonseca, Carlos &amp; Pereira, Fernando. (2008). Graph partitioning through a multi-objective evolutionary algorithm: A preliminary study. GECCO'08: Proceedings of the 10th Annual Conference on Genetic and Evolutionary Computation 2008. 625-632. 10.1145/1389095.1389222. </a:t>
             </a:r>
+          </a:p>
+          <a:p>
+            <a:endParaRPr lang="en-US" dirty="0"/>
+          </a:p>
+          <a:p>
+            <a:r>
+              <a:rPr lang="en-US" b="1" dirty="0"/>
+              <a:t>[2]</a:t>
+            </a:r>
+            <a:r>
+              <a:rPr lang="en-US" dirty="0"/>
+              <a:t> </a:t>
+            </a:r>
+            <a:r>
+              <a:rPr lang="en-US" dirty="0" err="1"/>
+              <a:t>Desdeo-mcdm</a:t>
+            </a:r>
+            <a:r>
+              <a:rPr lang="en-US" dirty="0"/>
+              <a:t>. (2021). Nautilus Navigator. Read the Docs. </a:t>
+            </a:r>
+            <a:r>
+              <a:rPr lang="en-US" dirty="0">
+                <a:hlinkClick r:id="rId2"/>
+              </a:rPr>
+              <a:t>https://desdeo-mcdm.readthedocs.io/en/latest/notebooks/nautilus_navigator.html</a:t>
+            </a:r>
+            <a:endParaRPr lang="en-US" dirty="0"/>
           </a:p>
         </p:txBody>
       </p:sp>
@@ -46969,7 +49242,7 @@
         <p:spPr>
           <a:xfrm>
             <a:off x="2699656" y="6047137"/>
-            <a:ext cx="6792685" cy="338554"/>
+            <a:ext cx="6792685" cy="584775"/>
           </a:xfrm>
           <a:prstGeom prst="rect">
             <a:avLst/>
@@ -47005,7 +49278,87 @@
                 <a:ea typeface="Roboto" panose="02000000000000000000" pitchFamily="2" charset="0"/>
                 <a:cs typeface="Roboto" panose="02000000000000000000" pitchFamily="2" charset="0"/>
               </a:rPr>
-              <a:t> data 2D, </a:t>
+              <a:t> data 2D </a:t>
+            </a:r>
+            <a:r>
+              <a:rPr lang="en-US" sz="1600" dirty="0" err="1">
+                <a:latin typeface="Roboto" panose="02000000000000000000" pitchFamily="2" charset="0"/>
+                <a:ea typeface="Roboto" panose="02000000000000000000" pitchFamily="2" charset="0"/>
+                <a:cs typeface="Roboto" panose="02000000000000000000" pitchFamily="2" charset="0"/>
+              </a:rPr>
+              <a:t>sebanyak</a:t>
+            </a:r>
+            <a:r>
+              <a:rPr lang="en-US" sz="1600" dirty="0">
+                <a:latin typeface="Roboto" panose="02000000000000000000" pitchFamily="2" charset="0"/>
+                <a:ea typeface="Roboto" panose="02000000000000000000" pitchFamily="2" charset="0"/>
+                <a:cs typeface="Roboto" panose="02000000000000000000" pitchFamily="2" charset="0"/>
+              </a:rPr>
+              <a:t> 50 </a:t>
+            </a:r>
+            <a:r>
+              <a:rPr lang="en-US" sz="1600" dirty="0" err="1">
+                <a:latin typeface="Roboto" panose="02000000000000000000" pitchFamily="2" charset="0"/>
+                <a:ea typeface="Roboto" panose="02000000000000000000" pitchFamily="2" charset="0"/>
+                <a:cs typeface="Roboto" panose="02000000000000000000" pitchFamily="2" charset="0"/>
+              </a:rPr>
+              <a:t>titik</a:t>
+            </a:r>
+            <a:r>
+              <a:rPr lang="en-US" sz="1600" dirty="0">
+                <a:latin typeface="Roboto" panose="02000000000000000000" pitchFamily="2" charset="0"/>
+                <a:ea typeface="Roboto" panose="02000000000000000000" pitchFamily="2" charset="0"/>
+                <a:cs typeface="Roboto" panose="02000000000000000000" pitchFamily="2" charset="0"/>
+              </a:rPr>
+              <a:t> </a:t>
+            </a:r>
+            <a:r>
+              <a:rPr lang="en-US" sz="1600" dirty="0" err="1">
+                <a:latin typeface="Roboto" panose="02000000000000000000" pitchFamily="2" charset="0"/>
+                <a:ea typeface="Roboto" panose="02000000000000000000" pitchFamily="2" charset="0"/>
+                <a:cs typeface="Roboto" panose="02000000000000000000" pitchFamily="2" charset="0"/>
+              </a:rPr>
+              <a:t>dengan</a:t>
+            </a:r>
+            <a:r>
+              <a:rPr lang="en-US" sz="1600" dirty="0">
+                <a:latin typeface="Roboto" panose="02000000000000000000" pitchFamily="2" charset="0"/>
+                <a:ea typeface="Roboto" panose="02000000000000000000" pitchFamily="2" charset="0"/>
+                <a:cs typeface="Roboto" panose="02000000000000000000" pitchFamily="2" charset="0"/>
+              </a:rPr>
+              <a:t> 4 </a:t>
+            </a:r>
+            <a:r>
+              <a:rPr lang="en-US" sz="1600" dirty="0" err="1">
+                <a:latin typeface="Roboto" panose="02000000000000000000" pitchFamily="2" charset="0"/>
+                <a:ea typeface="Roboto" panose="02000000000000000000" pitchFamily="2" charset="0"/>
+                <a:cs typeface="Roboto" panose="02000000000000000000" pitchFamily="2" charset="0"/>
+              </a:rPr>
+              <a:t>buah</a:t>
+            </a:r>
+            <a:r>
+              <a:rPr lang="en-US" sz="1600" dirty="0">
+                <a:latin typeface="Roboto" panose="02000000000000000000" pitchFamily="2" charset="0"/>
+                <a:ea typeface="Roboto" panose="02000000000000000000" pitchFamily="2" charset="0"/>
+                <a:cs typeface="Roboto" panose="02000000000000000000" pitchFamily="2" charset="0"/>
+              </a:rPr>
+              <a:t> </a:t>
+            </a:r>
+            <a:r>
+              <a:rPr lang="en-US" sz="1600" dirty="0" err="1">
+                <a:latin typeface="Roboto" panose="02000000000000000000" pitchFamily="2" charset="0"/>
+                <a:ea typeface="Roboto" panose="02000000000000000000" pitchFamily="2" charset="0"/>
+                <a:cs typeface="Roboto" panose="02000000000000000000" pitchFamily="2" charset="0"/>
+              </a:rPr>
+              <a:t>partisi</a:t>
+            </a:r>
+            <a:r>
+              <a:rPr lang="en-US" sz="1600" dirty="0">
+                <a:latin typeface="Roboto" panose="02000000000000000000" pitchFamily="2" charset="0"/>
+                <a:ea typeface="Roboto" panose="02000000000000000000" pitchFamily="2" charset="0"/>
+                <a:cs typeface="Roboto" panose="02000000000000000000" pitchFamily="2" charset="0"/>
+              </a:rPr>
+              <a:t>, </a:t>
             </a:r>
             <a:r>
               <a:rPr lang="en-US" sz="1600" dirty="0" err="1">

</xml_diff>